<commit_message>
ToTo: Variable timerTick entfernt.
Dokumente angepasst.
Ab sofort soll jeder der an einer Klasse arbeitet, das UML-Diagramm im PDF Ampelsteuerung.pptx selbständig anpassen.
</commit_message>
<xml_diff>
--- a/Dokumente/Ampelsteuerung.pptx
+++ b/Dokumente/Ampelsteuerung.pptx
@@ -5,7 +5,7 @@
     <p:sldMasterId id="2147484103" r:id="rId4"/>
   </p:sldMasterIdLst>
   <p:notesMasterIdLst>
-    <p:notesMasterId r:id="rId13"/>
+    <p:notesMasterId r:id="rId12"/>
   </p:notesMasterIdLst>
   <p:sldIdLst>
     <p:sldId id="338" r:id="rId5"/>
@@ -14,8 +14,7 @@
     <p:sldId id="341" r:id="rId8"/>
     <p:sldId id="342" r:id="rId9"/>
     <p:sldId id="337" r:id="rId10"/>
-    <p:sldId id="344" r:id="rId11"/>
-    <p:sldId id="343" r:id="rId12"/>
+    <p:sldId id="343" r:id="rId11"/>
   </p:sldIdLst>
   <p:sldSz cx="13004800" cy="9753600"/>
   <p:notesSz cx="7559675" cy="10691813"/>
@@ -136,7 +135,7 @@
 <file path=ppt/revisionInfo.xml><?xml version="1.0" encoding="utf-8"?>
 <p1510:revInfo xmlns:a="http://schemas.openxmlformats.org/drawingml/2006/main" xmlns:r="http://schemas.openxmlformats.org/officeDocument/2006/relationships" xmlns:p1510="http://schemas.microsoft.com/office/powerpoint/2015/10/main">
   <p1510:revLst>
-    <p1510:client id="{140F7F2F-255D-4D12-AACE-D60E0C8313F7}" v="54" dt="2018-11-03T21:31:37.254"/>
+    <p1510:client id="{140F7F2F-255D-4D12-AACE-D60E0C8313F7}" v="10" dt="2018-11-11T20:51:42.617"/>
   </p1510:revLst>
 </p1510:revInfo>
 </file>
@@ -144,38 +143,14 @@
 <file path=ppt/changesInfos/changesInfo1.xml><?xml version="1.0" encoding="utf-8"?>
 <pc:chgInfo xmlns:a="http://schemas.openxmlformats.org/drawingml/2006/main" xmlns:r="http://schemas.openxmlformats.org/officeDocument/2006/relationships" xmlns:ac="http://schemas.microsoft.com/office/drawing/2013/main/command" xmlns:pc="http://schemas.microsoft.com/office/powerpoint/2013/main/command">
   <pc:docChgLst>
-    <pc:chgData name="Patrick Schweizer" userId="S::patrick.schweizer@edu.teko.ch::e8285e44-a4c6-4735-b3a2-6317fdeeb080" providerId="AD" clId="Web-{208B3CCE-FB6D-40D0-8D16-216DB8D0B5E9}"/>
-    <pc:docChg chg="modSld">
-      <pc:chgData name="Patrick Schweizer" userId="S::patrick.schweizer@edu.teko.ch::e8285e44-a4c6-4735-b3a2-6317fdeeb080" providerId="AD" clId="Web-{208B3CCE-FB6D-40D0-8D16-216DB8D0B5E9}" dt="2018-11-01T09:48:38.780" v="79" actId="20577"/>
-      <pc:docMkLst>
-        <pc:docMk/>
-      </pc:docMkLst>
-      <pc:sldChg chg="modSp">
-        <pc:chgData name="Patrick Schweizer" userId="S::patrick.schweizer@edu.teko.ch::e8285e44-a4c6-4735-b3a2-6317fdeeb080" providerId="AD" clId="Web-{208B3CCE-FB6D-40D0-8D16-216DB8D0B5E9}" dt="2018-11-01T09:48:38.780" v="78" actId="20577"/>
-        <pc:sldMkLst>
-          <pc:docMk/>
-          <pc:sldMk cId="2014623675" sldId="338"/>
-        </pc:sldMkLst>
-        <pc:spChg chg="mod">
-          <ac:chgData name="Patrick Schweizer" userId="S::patrick.schweizer@edu.teko.ch::e8285e44-a4c6-4735-b3a2-6317fdeeb080" providerId="AD" clId="Web-{208B3CCE-FB6D-40D0-8D16-216DB8D0B5E9}" dt="2018-11-01T09:48:38.780" v="78" actId="20577"/>
-          <ac:spMkLst>
-            <pc:docMk/>
-            <pc:sldMk cId="2014623675" sldId="338"/>
-            <ac:spMk id="2" creationId="{FCC2C456-3CFD-4E49-9D7B-6783CDC01DB5}"/>
-          </ac:spMkLst>
-        </pc:spChg>
-      </pc:sldChg>
-    </pc:docChg>
-  </pc:docChgLst>
-  <pc:docChgLst>
     <pc:chgData name="Patrick Schweizer" userId="e8285e44-a4c6-4735-b3a2-6317fdeeb080" providerId="ADAL" clId="{140F7F2F-255D-4D12-AACE-D60E0C8313F7}"/>
-    <pc:docChg chg="undo custSel addSld modSld">
-      <pc:chgData name="Patrick Schweizer" userId="e8285e44-a4c6-4735-b3a2-6317fdeeb080" providerId="ADAL" clId="{140F7F2F-255D-4D12-AACE-D60E0C8313F7}" dt="2018-11-03T21:33:52.600" v="1450" actId="1076"/>
+    <pc:docChg chg="undo custSel addSld delSld modSld">
+      <pc:chgData name="Patrick Schweizer" userId="e8285e44-a4c6-4735-b3a2-6317fdeeb080" providerId="ADAL" clId="{140F7F2F-255D-4D12-AACE-D60E0C8313F7}" dt="2018-11-11T20:54:30.671" v="1701" actId="1076"/>
       <pc:docMkLst>
         <pc:docMk/>
       </pc:docMkLst>
       <pc:sldChg chg="addSp delSp modSp">
-        <pc:chgData name="Patrick Schweizer" userId="e8285e44-a4c6-4735-b3a2-6317fdeeb080" providerId="ADAL" clId="{140F7F2F-255D-4D12-AACE-D60E0C8313F7}" dt="2018-11-03T21:25:39.593" v="1280" actId="114"/>
+        <pc:chgData name="Patrick Schweizer" userId="e8285e44-a4c6-4735-b3a2-6317fdeeb080" providerId="ADAL" clId="{140F7F2F-255D-4D12-AACE-D60E0C8313F7}" dt="2018-11-11T20:54:30.671" v="1701" actId="1076"/>
         <pc:sldMkLst>
           <pc:docMk/>
           <pc:sldMk cId="3808898787" sldId="337"/>
@@ -253,7 +228,7 @@
           </ac:spMkLst>
         </pc:spChg>
         <pc:spChg chg="mod">
-          <ac:chgData name="Patrick Schweizer" userId="e8285e44-a4c6-4735-b3a2-6317fdeeb080" providerId="ADAL" clId="{140F7F2F-255D-4D12-AACE-D60E0C8313F7}" dt="2018-11-01T19:34:21.407" v="14" actId="20577"/>
+          <ac:chgData name="Patrick Schweizer" userId="e8285e44-a4c6-4735-b3a2-6317fdeeb080" providerId="ADAL" clId="{140F7F2F-255D-4D12-AACE-D60E0C8313F7}" dt="2018-11-11T20:46:56.792" v="1475" actId="20577"/>
           <ac:spMkLst>
             <pc:docMk/>
             <pc:sldMk cId="3808898787" sldId="337"/>
@@ -269,7 +244,7 @@
           </ac:spMkLst>
         </pc:spChg>
         <pc:spChg chg="mod">
-          <ac:chgData name="Patrick Schweizer" userId="e8285e44-a4c6-4735-b3a2-6317fdeeb080" providerId="ADAL" clId="{140F7F2F-255D-4D12-AACE-D60E0C8313F7}" dt="2018-11-01T19:34:24.746" v="16" actId="20577"/>
+          <ac:chgData name="Patrick Schweizer" userId="e8285e44-a4c6-4735-b3a2-6317fdeeb080" providerId="ADAL" clId="{140F7F2F-255D-4D12-AACE-D60E0C8313F7}" dt="2018-11-11T20:52:31.056" v="1580" actId="20577"/>
           <ac:spMkLst>
             <pc:docMk/>
             <pc:sldMk cId="3808898787" sldId="337"/>
@@ -277,7 +252,7 @@
           </ac:spMkLst>
         </pc:spChg>
         <pc:spChg chg="mod">
-          <ac:chgData name="Patrick Schweizer" userId="e8285e44-a4c6-4735-b3a2-6317fdeeb080" providerId="ADAL" clId="{140F7F2F-255D-4D12-AACE-D60E0C8313F7}" dt="2018-11-01T19:47:53.327" v="113" actId="20577"/>
+          <ac:chgData name="Patrick Schweizer" userId="e8285e44-a4c6-4735-b3a2-6317fdeeb080" providerId="ADAL" clId="{140F7F2F-255D-4D12-AACE-D60E0C8313F7}" dt="2018-11-11T20:47:43.040" v="1487" actId="20577"/>
           <ac:spMkLst>
             <pc:docMk/>
             <pc:sldMk cId="3808898787" sldId="337"/>
@@ -285,7 +260,7 @@
           </ac:spMkLst>
         </pc:spChg>
         <pc:spChg chg="mod">
-          <ac:chgData name="Patrick Schweizer" userId="e8285e44-a4c6-4735-b3a2-6317fdeeb080" providerId="ADAL" clId="{140F7F2F-255D-4D12-AACE-D60E0C8313F7}" dt="2018-11-01T19:55:09.921" v="139" actId="20577"/>
+          <ac:chgData name="Patrick Schweizer" userId="e8285e44-a4c6-4735-b3a2-6317fdeeb080" providerId="ADAL" clId="{140F7F2F-255D-4D12-AACE-D60E0C8313F7}" dt="2018-11-11T20:52:48.664" v="1581" actId="20577"/>
           <ac:spMkLst>
             <pc:docMk/>
             <pc:sldMk cId="3808898787" sldId="337"/>
@@ -301,7 +276,15 @@
           </ac:spMkLst>
         </pc:spChg>
         <pc:spChg chg="mod">
-          <ac:chgData name="Patrick Schweizer" userId="e8285e44-a4c6-4735-b3a2-6317fdeeb080" providerId="ADAL" clId="{140F7F2F-255D-4D12-AACE-D60E0C8313F7}" dt="2018-11-01T19:52:34.339" v="135" actId="20577"/>
+          <ac:chgData name="Patrick Schweizer" userId="e8285e44-a4c6-4735-b3a2-6317fdeeb080" providerId="ADAL" clId="{140F7F2F-255D-4D12-AACE-D60E0C8313F7}" dt="2018-11-11T20:54:13.517" v="1678" actId="20577"/>
+          <ac:spMkLst>
+            <pc:docMk/>
+            <pc:sldMk cId="3808898787" sldId="337"/>
+            <ac:spMk id="69" creationId="{32467F97-1B33-4383-94F6-79909B8EDD96}"/>
+          </ac:spMkLst>
+        </pc:spChg>
+        <pc:spChg chg="mod">
+          <ac:chgData name="Patrick Schweizer" userId="e8285e44-a4c6-4735-b3a2-6317fdeeb080" providerId="ADAL" clId="{140F7F2F-255D-4D12-AACE-D60E0C8313F7}" dt="2018-11-11T20:54:21.265" v="1699" actId="1036"/>
           <ac:spMkLst>
             <pc:docMk/>
             <pc:sldMk cId="3808898787" sldId="337"/>
@@ -365,7 +348,7 @@
           </ac:spMkLst>
         </pc:spChg>
         <pc:spChg chg="add mod">
-          <ac:chgData name="Patrick Schweizer" userId="e8285e44-a4c6-4735-b3a2-6317fdeeb080" providerId="ADAL" clId="{140F7F2F-255D-4D12-AACE-D60E0C8313F7}" dt="2018-11-01T20:01:15.635" v="424" actId="113"/>
+          <ac:chgData name="Patrick Schweizer" userId="e8285e44-a4c6-4735-b3a2-6317fdeeb080" providerId="ADAL" clId="{140F7F2F-255D-4D12-AACE-D60E0C8313F7}" dt="2018-11-11T20:54:27.774" v="1700" actId="1076"/>
           <ac:spMkLst>
             <pc:docMk/>
             <pc:sldMk cId="3808898787" sldId="337"/>
@@ -378,6 +361,14 @@
             <pc:docMk/>
             <pc:sldMk cId="3808898787" sldId="337"/>
             <ac:spMk id="85" creationId="{69363762-1A65-46A8-9743-617FE58D714A}"/>
+          </ac:spMkLst>
+        </pc:spChg>
+        <pc:spChg chg="mod">
+          <ac:chgData name="Patrick Schweizer" userId="e8285e44-a4c6-4735-b3a2-6317fdeeb080" providerId="ADAL" clId="{140F7F2F-255D-4D12-AACE-D60E0C8313F7}" dt="2018-11-11T20:54:10.062" v="1677" actId="5793"/>
+          <ac:spMkLst>
+            <pc:docMk/>
+            <pc:sldMk cId="3808898787" sldId="337"/>
+            <ac:spMk id="86" creationId="{0F314504-AC53-47EF-938B-BA9B4419240C}"/>
           </ac:spMkLst>
         </pc:spChg>
         <pc:spChg chg="mod">
@@ -394,6 +385,14 @@
             <pc:docMk/>
             <pc:sldMk cId="3808898787" sldId="337"/>
             <ac:spMk id="87" creationId="{1CE3809C-4D0F-46F2-AD71-C1E5ECE14F9A}"/>
+          </ac:spMkLst>
+        </pc:spChg>
+        <pc:spChg chg="mod">
+          <ac:chgData name="Patrick Schweizer" userId="e8285e44-a4c6-4735-b3a2-6317fdeeb080" providerId="ADAL" clId="{140F7F2F-255D-4D12-AACE-D60E0C8313F7}" dt="2018-11-11T20:53:25.946" v="1622" actId="1035"/>
+          <ac:spMkLst>
+            <pc:docMk/>
+            <pc:sldMk cId="3808898787" sldId="337"/>
+            <ac:spMk id="87" creationId="{B34607EA-B866-43EF-86BE-C88858BF89FF}"/>
           </ac:spMkLst>
         </pc:spChg>
         <pc:spChg chg="mod">
@@ -437,7 +436,7 @@
           </ac:grpSpMkLst>
         </pc:grpChg>
         <pc:grpChg chg="mod">
-          <ac:chgData name="Patrick Schweizer" userId="e8285e44-a4c6-4735-b3a2-6317fdeeb080" providerId="ADAL" clId="{140F7F2F-255D-4D12-AACE-D60E0C8313F7}" dt="2018-11-01T19:50:45.032" v="126" actId="1076"/>
+          <ac:chgData name="Patrick Schweizer" userId="e8285e44-a4c6-4735-b3a2-6317fdeeb080" providerId="ADAL" clId="{140F7F2F-255D-4D12-AACE-D60E0C8313F7}" dt="2018-11-11T20:50:46.640" v="1548" actId="1076"/>
           <ac:grpSpMkLst>
             <pc:docMk/>
             <pc:sldMk cId="3808898787" sldId="337"/>
@@ -445,7 +444,7 @@
           </ac:grpSpMkLst>
         </pc:grpChg>
         <pc:grpChg chg="mod">
-          <ac:chgData name="Patrick Schweizer" userId="e8285e44-a4c6-4735-b3a2-6317fdeeb080" providerId="ADAL" clId="{140F7F2F-255D-4D12-AACE-D60E0C8313F7}" dt="2018-11-01T19:50:50.100" v="127" actId="1076"/>
+          <ac:chgData name="Patrick Schweizer" userId="e8285e44-a4c6-4735-b3a2-6317fdeeb080" providerId="ADAL" clId="{140F7F2F-255D-4D12-AACE-D60E0C8313F7}" dt="2018-11-11T20:53:54.782" v="1660" actId="1076"/>
           <ac:grpSpMkLst>
             <pc:docMk/>
             <pc:sldMk cId="3808898787" sldId="337"/>
@@ -469,11 +468,19 @@
           </ac:grpSpMkLst>
         </pc:grpChg>
         <pc:grpChg chg="mod">
-          <ac:chgData name="Patrick Schweizer" userId="e8285e44-a4c6-4735-b3a2-6317fdeeb080" providerId="ADAL" clId="{140F7F2F-255D-4D12-AACE-D60E0C8313F7}" dt="2018-11-01T19:50:55.490" v="128" actId="1076"/>
+          <ac:chgData name="Patrick Schweizer" userId="e8285e44-a4c6-4735-b3a2-6317fdeeb080" providerId="ADAL" clId="{140F7F2F-255D-4D12-AACE-D60E0C8313F7}" dt="2018-11-11T20:54:30.671" v="1701" actId="1076"/>
           <ac:grpSpMkLst>
             <pc:docMk/>
             <pc:sldMk cId="3808898787" sldId="337"/>
             <ac:grpSpMk id="71" creationId="{09DCE76F-3385-449C-89A2-EE73830081AE}"/>
+          </ac:grpSpMkLst>
+        </pc:grpChg>
+        <pc:grpChg chg="add mod">
+          <ac:chgData name="Patrick Schweizer" userId="e8285e44-a4c6-4735-b3a2-6317fdeeb080" providerId="ADAL" clId="{140F7F2F-255D-4D12-AACE-D60E0C8313F7}" dt="2018-11-11T20:51:42.617" v="1556"/>
+          <ac:grpSpMkLst>
+            <pc:docMk/>
+            <pc:sldMk cId="3808898787" sldId="337"/>
+            <ac:grpSpMk id="79" creationId="{C69E60F5-5D85-4B71-9BD6-36DA159B3443}"/>
           </ac:grpSpMkLst>
         </pc:grpChg>
         <pc:grpChg chg="add del mod">
@@ -484,8 +491,16 @@
             <ac:grpSpMk id="81" creationId="{4AE8CF17-CD5A-4D9D-A7DA-043E2BB1C475}"/>
           </ac:grpSpMkLst>
         </pc:grpChg>
-        <pc:picChg chg="add mod">
-          <ac:chgData name="Patrick Schweizer" userId="e8285e44-a4c6-4735-b3a2-6317fdeeb080" providerId="ADAL" clId="{140F7F2F-255D-4D12-AACE-D60E0C8313F7}" dt="2018-11-01T19:54:14.037" v="137" actId="1076"/>
+        <pc:grpChg chg="add mod">
+          <ac:chgData name="Patrick Schweizer" userId="e8285e44-a4c6-4735-b3a2-6317fdeeb080" providerId="ADAL" clId="{140F7F2F-255D-4D12-AACE-D60E0C8313F7}" dt="2018-11-11T20:50:52.531" v="1549" actId="1076"/>
+          <ac:grpSpMkLst>
+            <pc:docMk/>
+            <pc:sldMk cId="3808898787" sldId="337"/>
+            <ac:grpSpMk id="88" creationId="{CAF1B52C-A54C-45EF-A512-D5370E020A99}"/>
+          </ac:grpSpMkLst>
+        </pc:grpChg>
+        <pc:picChg chg="add del mod">
+          <ac:chgData name="Patrick Schweizer" userId="e8285e44-a4c6-4735-b3a2-6317fdeeb080" providerId="ADAL" clId="{140F7F2F-255D-4D12-AACE-D60E0C8313F7}" dt="2018-11-11T20:47:19.766" v="1477" actId="478"/>
           <ac:picMkLst>
             <pc:docMk/>
             <pc:sldMk cId="3808898787" sldId="337"/>
@@ -501,7 +516,7 @@
           </ac:picMkLst>
         </pc:picChg>
         <pc:cxnChg chg="mod">
-          <ac:chgData name="Patrick Schweizer" userId="e8285e44-a4c6-4735-b3a2-6317fdeeb080" providerId="ADAL" clId="{140F7F2F-255D-4D12-AACE-D60E0C8313F7}" dt="2018-11-01T19:52:34.339" v="135" actId="20577"/>
+          <ac:chgData name="Patrick Schweizer" userId="e8285e44-a4c6-4735-b3a2-6317fdeeb080" providerId="ADAL" clId="{140F7F2F-255D-4D12-AACE-D60E0C8313F7}" dt="2018-11-11T20:52:51.293" v="1582" actId="14100"/>
           <ac:cxnSpMkLst>
             <pc:docMk/>
             <pc:sldMk cId="3808898787" sldId="337"/>
@@ -517,7 +532,7 @@
           </ac:cxnSpMkLst>
         </pc:cxnChg>
         <pc:cxnChg chg="mod">
-          <ac:chgData name="Patrick Schweizer" userId="e8285e44-a4c6-4735-b3a2-6317fdeeb080" providerId="ADAL" clId="{140F7F2F-255D-4D12-AACE-D60E0C8313F7}" dt="2018-11-03T21:24:28.583" v="1270" actId="20577"/>
+          <ac:chgData name="Patrick Schweizer" userId="e8285e44-a4c6-4735-b3a2-6317fdeeb080" providerId="ADAL" clId="{140F7F2F-255D-4D12-AACE-D60E0C8313F7}" dt="2018-11-11T20:53:54.782" v="1660" actId="1076"/>
           <ac:cxnSpMkLst>
             <pc:docMk/>
             <pc:sldMk cId="3808898787" sldId="337"/>
@@ -541,7 +556,7 @@
           </ac:cxnSpMkLst>
         </pc:cxnChg>
         <pc:cxnChg chg="mod">
-          <ac:chgData name="Patrick Schweizer" userId="e8285e44-a4c6-4735-b3a2-6317fdeeb080" providerId="ADAL" clId="{140F7F2F-255D-4D12-AACE-D60E0C8313F7}" dt="2018-11-03T21:24:28.583" v="1270" actId="20577"/>
+          <ac:chgData name="Patrick Schweizer" userId="e8285e44-a4c6-4735-b3a2-6317fdeeb080" providerId="ADAL" clId="{140F7F2F-255D-4D12-AACE-D60E0C8313F7}" dt="2018-11-11T20:54:30.671" v="1701" actId="1076"/>
           <ac:cxnSpMkLst>
             <pc:docMk/>
             <pc:sldMk cId="3808898787" sldId="337"/>
@@ -549,11 +564,19 @@
           </ac:cxnSpMkLst>
         </pc:cxnChg>
         <pc:cxnChg chg="add mod">
-          <ac:chgData name="Patrick Schweizer" userId="e8285e44-a4c6-4735-b3a2-6317fdeeb080" providerId="ADAL" clId="{140F7F2F-255D-4D12-AACE-D60E0C8313F7}" dt="2018-11-01T19:50:59.578" v="129" actId="1076"/>
+          <ac:chgData name="Patrick Schweizer" userId="e8285e44-a4c6-4735-b3a2-6317fdeeb080" providerId="ADAL" clId="{140F7F2F-255D-4D12-AACE-D60E0C8313F7}" dt="2018-11-11T20:52:48.664" v="1581" actId="20577"/>
           <ac:cxnSpMkLst>
             <pc:docMk/>
             <pc:sldMk cId="3808898787" sldId="337"/>
             <ac:cxnSpMk id="76" creationId="{1DA2827B-9FE3-46D0-8464-41AE5FA4C59B}"/>
+          </ac:cxnSpMkLst>
+        </pc:cxnChg>
+        <pc:cxnChg chg="add mod">
+          <ac:chgData name="Patrick Schweizer" userId="e8285e44-a4c6-4735-b3a2-6317fdeeb080" providerId="ADAL" clId="{140F7F2F-255D-4D12-AACE-D60E0C8313F7}" dt="2018-11-11T20:52:54.671" v="1583" actId="14100"/>
+          <ac:cxnSpMkLst>
+            <pc:docMk/>
+            <pc:sldMk cId="3808898787" sldId="337"/>
+            <ac:cxnSpMk id="92" creationId="{DE4873E0-67DE-4C96-BA6D-FC6466DD0816}"/>
           </ac:cxnSpMkLst>
         </pc:cxnChg>
       </pc:sldChg>
@@ -581,7 +604,22 @@
         </pc:picChg>
       </pc:sldChg>
       <pc:sldChg chg="modSp">
-        <pc:chgData name="Patrick Schweizer" userId="e8285e44-a4c6-4735-b3a2-6317fdeeb080" providerId="ADAL" clId="{140F7F2F-255D-4D12-AACE-D60E0C8313F7}" dt="2018-11-01T20:19:48.601" v="519" actId="20577"/>
+        <pc:chgData name="Patrick Schweizer" userId="e8285e44-a4c6-4735-b3a2-6317fdeeb080" providerId="ADAL" clId="{140F7F2F-255D-4D12-AACE-D60E0C8313F7}" dt="2018-11-11T20:46:20.526" v="1458" actId="14734"/>
+        <pc:sldMkLst>
+          <pc:docMk/>
+          <pc:sldMk cId="2540486635" sldId="340"/>
+        </pc:sldMkLst>
+        <pc:graphicFrameChg chg="modGraphic">
+          <ac:chgData name="Patrick Schweizer" userId="e8285e44-a4c6-4735-b3a2-6317fdeeb080" providerId="ADAL" clId="{140F7F2F-255D-4D12-AACE-D60E0C8313F7}" dt="2018-11-11T20:46:20.526" v="1458" actId="14734"/>
+          <ac:graphicFrameMkLst>
+            <pc:docMk/>
+            <pc:sldMk cId="2540486635" sldId="340"/>
+            <ac:graphicFrameMk id="4" creationId="{FBA930BC-905D-4C09-9266-C8070E0F72AF}"/>
+          </ac:graphicFrameMkLst>
+        </pc:graphicFrameChg>
+      </pc:sldChg>
+      <pc:sldChg chg="addSp modSp">
+        <pc:chgData name="Patrick Schweizer" userId="e8285e44-a4c6-4735-b3a2-6317fdeeb080" providerId="ADAL" clId="{140F7F2F-255D-4D12-AACE-D60E0C8313F7}" dt="2018-11-11T20:46:09.338" v="1456" actId="20577"/>
         <pc:sldMkLst>
           <pc:docMk/>
           <pc:sldMk cId="918007530" sldId="341"/>
@@ -592,6 +630,14 @@
             <pc:docMk/>
             <pc:sldMk cId="918007530" sldId="341"/>
             <ac:spMk id="7" creationId="{654B67E9-FFF5-4A42-AA5E-E7713837AB7F}"/>
+          </ac:spMkLst>
+        </pc:spChg>
+        <pc:spChg chg="add mod">
+          <ac:chgData name="Patrick Schweizer" userId="e8285e44-a4c6-4735-b3a2-6317fdeeb080" providerId="ADAL" clId="{140F7F2F-255D-4D12-AACE-D60E0C8313F7}" dt="2018-11-11T20:46:09.338" v="1456" actId="20577"/>
+          <ac:spMkLst>
+            <pc:docMk/>
+            <pc:sldMk cId="918007530" sldId="341"/>
+            <ac:spMk id="8" creationId="{96818D2A-5403-4104-BCE4-FB8E80AA0DEC}"/>
           </ac:spMkLst>
         </pc:spChg>
       </pc:sldChg>
@@ -842,8 +888,8 @@
           </ac:cxnSpMkLst>
         </pc:cxnChg>
       </pc:sldChg>
-      <pc:sldChg chg="modSp add">
-        <pc:chgData name="Patrick Schweizer" userId="e8285e44-a4c6-4735-b3a2-6317fdeeb080" providerId="ADAL" clId="{140F7F2F-255D-4D12-AACE-D60E0C8313F7}" dt="2018-11-03T21:33:52.600" v="1450" actId="1076"/>
+      <pc:sldChg chg="modSp add del">
+        <pc:chgData name="Patrick Schweizer" userId="e8285e44-a4c6-4735-b3a2-6317fdeeb080" providerId="ADAL" clId="{140F7F2F-255D-4D12-AACE-D60E0C8313F7}" dt="2018-11-11T20:45:45.124" v="1451" actId="2696"/>
         <pc:sldMkLst>
           <pc:docMk/>
           <pc:sldMk cId="2531455901" sldId="344"/>
@@ -862,6 +908,54 @@
             <pc:docMk/>
             <pc:sldMk cId="2531455901" sldId="344"/>
             <ac:spMk id="3" creationId="{96303AB0-3E83-44F3-BE6A-6A3795EC075A}"/>
+          </ac:spMkLst>
+        </pc:spChg>
+      </pc:sldChg>
+    </pc:docChg>
+  </pc:docChgLst>
+  <pc:docChgLst>
+    <pc:chgData name="Daniel Reiter" userId="a85cd42d-b5dd-4de7-81f5-2585415cc29e" providerId="ADAL" clId="{2510A963-2416-4444-B4A3-9448D52937BB}"/>
+    <pc:docChg chg="modSld">
+      <pc:chgData name="Daniel Reiter" userId="a85cd42d-b5dd-4de7-81f5-2585415cc29e" providerId="ADAL" clId="{2510A963-2416-4444-B4A3-9448D52937BB}" dt="2018-11-05T17:01:25.688" v="0" actId="1076"/>
+      <pc:docMkLst>
+        <pc:docMk/>
+      </pc:docMkLst>
+      <pc:sldChg chg="modSp">
+        <pc:chgData name="Daniel Reiter" userId="a85cd42d-b5dd-4de7-81f5-2585415cc29e" providerId="ADAL" clId="{2510A963-2416-4444-B4A3-9448D52937BB}" dt="2018-11-05T17:01:25.688" v="0" actId="1076"/>
+        <pc:sldMkLst>
+          <pc:docMk/>
+          <pc:sldMk cId="3808898787" sldId="337"/>
+        </pc:sldMkLst>
+        <pc:picChg chg="mod">
+          <ac:chgData name="Daniel Reiter" userId="a85cd42d-b5dd-4de7-81f5-2585415cc29e" providerId="ADAL" clId="{2510A963-2416-4444-B4A3-9448D52937BB}" dt="2018-11-05T17:01:25.688" v="0" actId="1076"/>
+          <ac:picMkLst>
+            <pc:docMk/>
+            <pc:sldMk cId="3808898787" sldId="337"/>
+            <ac:picMk id="75" creationId="{B62D909F-5A35-4C5E-B55D-62A6145BDDB2}"/>
+          </ac:picMkLst>
+        </pc:picChg>
+      </pc:sldChg>
+    </pc:docChg>
+  </pc:docChgLst>
+  <pc:docChgLst>
+    <pc:chgData name="Patrick Schweizer" userId="S::patrick.schweizer@edu.teko.ch::e8285e44-a4c6-4735-b3a2-6317fdeeb080" providerId="AD" clId="Web-{208B3CCE-FB6D-40D0-8D16-216DB8D0B5E9}"/>
+    <pc:docChg chg="modSld">
+      <pc:chgData name="Patrick Schweizer" userId="S::patrick.schweizer@edu.teko.ch::e8285e44-a4c6-4735-b3a2-6317fdeeb080" providerId="AD" clId="Web-{208B3CCE-FB6D-40D0-8D16-216DB8D0B5E9}" dt="2018-11-01T09:48:38.780" v="79" actId="20577"/>
+      <pc:docMkLst>
+        <pc:docMk/>
+      </pc:docMkLst>
+      <pc:sldChg chg="modSp">
+        <pc:chgData name="Patrick Schweizer" userId="S::patrick.schweizer@edu.teko.ch::e8285e44-a4c6-4735-b3a2-6317fdeeb080" providerId="AD" clId="Web-{208B3CCE-FB6D-40D0-8D16-216DB8D0B5E9}" dt="2018-11-01T09:48:38.780" v="78" actId="20577"/>
+        <pc:sldMkLst>
+          <pc:docMk/>
+          <pc:sldMk cId="2014623675" sldId="338"/>
+        </pc:sldMkLst>
+        <pc:spChg chg="mod">
+          <ac:chgData name="Patrick Schweizer" userId="S::patrick.schweizer@edu.teko.ch::e8285e44-a4c6-4735-b3a2-6317fdeeb080" providerId="AD" clId="Web-{208B3CCE-FB6D-40D0-8D16-216DB8D0B5E9}" dt="2018-11-01T09:48:38.780" v="78" actId="20577"/>
+          <ac:spMkLst>
+            <pc:docMk/>
+            <pc:sldMk cId="2014623675" sldId="338"/>
+            <ac:spMk id="2" creationId="{FCC2C456-3CFD-4E49-9D7B-6783CDC01DB5}"/>
           </ac:spMkLst>
         </pc:spChg>
       </pc:sldChg>
@@ -3234,17 +3328,17 @@
           <a:lstStyle/>
           <a:p>
             <a:r>
-              <a:rPr lang="de-CH" sz="4800" dirty="0" err="1"/>
+              <a:rPr lang="de-CH" sz="4800" err="1"/>
               <a:t>Draftversion</a:t>
             </a:r>
             <a:r>
-              <a:rPr lang="de-CH" sz="4800" dirty="0"/>
+              <a:rPr lang="de-CH" sz="4800"/>
               <a:t>:</a:t>
             </a:r>
           </a:p>
           <a:p>
             <a:r>
-              <a:rPr lang="de-CH" sz="4800" dirty="0"/>
+              <a:rPr lang="de-CH" sz="4800"/>
               <a:t>	UML Ampelsteuerung</a:t>
             </a:r>
           </a:p>
@@ -4431,7 +4525,7 @@
           <p:nvPr>
             <p:extLst>
               <p:ext uri="{D42A27DB-BD31-4B8C-83A1-F6EECF244321}">
-                <p14:modId xmlns:p14="http://schemas.microsoft.com/office/powerpoint/2010/main" val="3520248725"/>
+                <p14:modId xmlns:p14="http://schemas.microsoft.com/office/powerpoint/2010/main" val="3578518184"/>
               </p:ext>
             </p:extLst>
           </p:nvPr>
@@ -4688,11 +4782,11 @@
                     <a:lstStyle/>
                     <a:p>
                       <a:r>
-                        <a:rPr lang="de-CH" err="1"/>
+                        <a:rPr lang="de-CH" dirty="0" err="1"/>
                         <a:t>Id</a:t>
                       </a:r>
                       <a:r>
-                        <a:rPr lang="de-CH"/>
+                        <a:rPr lang="de-CH" dirty="0"/>
                         <a:t>: 1</a:t>
                       </a:r>
                     </a:p>
@@ -5360,7 +5454,7 @@
                     <a:lstStyle/>
                     <a:p>
                       <a:r>
-                        <a:rPr lang="de-CH"/>
+                        <a:rPr lang="de-CH" dirty="0"/>
                         <a:t>Rot</a:t>
                       </a:r>
                     </a:p>
@@ -5491,7 +5585,7 @@
           <a:lstStyle/>
           <a:p>
             <a:r>
-              <a:rPr lang="de-CH" sz="3200"/>
+              <a:rPr lang="de-CH" sz="3200" dirty="0"/>
               <a:t>Open Points:</a:t>
             </a:r>
           </a:p>
@@ -5501,14 +5595,14 @@
               <a:buChar char="-"/>
             </a:pPr>
             <a:r>
-              <a:rPr lang="de-CH" sz="3200"/>
+              <a:rPr lang="de-CH" sz="3200" dirty="0"/>
               <a:t>Fussgängerampel bei </a:t>
             </a:r>
             <a:br>
-              <a:rPr lang="de-CH" sz="3200"/>
+              <a:rPr lang="de-CH" sz="3200" dirty="0"/>
             </a:br>
             <a:r>
-              <a:rPr lang="de-CH" sz="3200"/>
+              <a:rPr lang="de-CH" sz="3200" dirty="0"/>
               <a:t>Links- Rechtsabbieger</a:t>
             </a:r>
           </a:p>
@@ -5683,14 +5777,14 @@
           <a:lstStyle/>
           <a:p>
             <a:r>
-              <a:rPr lang="de-CH" sz="2800"/>
+              <a:rPr lang="de-CH" sz="2800" dirty="0"/>
               <a:t>Eigenschaft: </a:t>
             </a:r>
             <a:r>
-              <a:rPr lang="de-CH" sz="2800" err="1"/>
+              <a:rPr lang="de-CH" sz="2800" dirty="0" err="1"/>
               <a:t>actState</a:t>
             </a:r>
-            <a:endParaRPr lang="de-CH" sz="2800"/>
+            <a:endParaRPr lang="de-CH" sz="2800" dirty="0"/>
           </a:p>
         </p:txBody>
       </p:sp>
@@ -5841,6 +5935,41 @@
           </a:p>
         </p:txBody>
       </p:sp>
+      <p:sp>
+        <p:nvSpPr>
+          <p:cNvPr id="8" name="Rechteck 7">
+            <a:extLst>
+              <a:ext uri="{FF2B5EF4-FFF2-40B4-BE49-F238E27FC236}">
+                <a16:creationId xmlns:a16="http://schemas.microsoft.com/office/drawing/2014/main" id="{96818D2A-5403-4104-BCE4-FB8E80AA0DEC}"/>
+              </a:ext>
+            </a:extLst>
+          </p:cNvPr>
+          <p:cNvSpPr/>
+          <p:nvPr/>
+        </p:nvSpPr>
+        <p:spPr>
+          <a:xfrm>
+            <a:off x="5648593" y="4183142"/>
+            <a:ext cx="1085554" cy="523220"/>
+          </a:xfrm>
+          <a:prstGeom prst="rect">
+            <a:avLst/>
+          </a:prstGeom>
+        </p:spPr>
+        <p:txBody>
+          <a:bodyPr wrap="none">
+            <a:spAutoFit/>
+          </a:bodyPr>
+          <a:lstStyle/>
+          <a:p>
+            <a:r>
+              <a:rPr lang="de-CH" sz="2800" dirty="0" err="1"/>
+              <a:t>enum</a:t>
+            </a:r>
+            <a:endParaRPr lang="de-CH" sz="2800" dirty="0"/>
+          </a:p>
+        </p:txBody>
+      </p:sp>
     </p:spTree>
     <p:extLst>
       <p:ext uri="{BB962C8B-B14F-4D97-AF65-F5344CB8AC3E}">
@@ -5893,7 +6022,7 @@
           <a:lstStyle/>
           <a:p>
             <a:r>
-              <a:rPr lang="de-CH" dirty="0"/>
+              <a:rPr lang="de-CH"/>
               <a:t>Car</a:t>
             </a:r>
           </a:p>
@@ -6149,22 +6278,22 @@
                 <a:buChar char="-"/>
               </a:pPr>
               <a:r>
-                <a:rPr lang="de-CH" dirty="0"/>
+                <a:rPr lang="de-CH"/>
                 <a:t> </a:t>
               </a:r>
               <a:r>
-                <a:rPr lang="de-CH" dirty="0" err="1"/>
+                <a:rPr lang="de-CH" err="1"/>
                 <a:t>carsAndRoute</a:t>
               </a:r>
               <a:r>
-                <a:rPr lang="de-CH" dirty="0"/>
+                <a:rPr lang="de-CH"/>
                 <a:t>: </a:t>
               </a:r>
               <a:r>
-                <a:rPr lang="de-CH" dirty="0" err="1"/>
+                <a:rPr lang="de-CH" err="1"/>
                 <a:t>HashMap</a:t>
               </a:r>
-              <a:endParaRPr lang="de-CH" dirty="0"/>
+              <a:endParaRPr lang="de-CH"/>
             </a:p>
             <a:p>
               <a:pPr>
@@ -6172,22 +6301,22 @@
                 <a:buChar char="-"/>
               </a:pPr>
               <a:r>
-                <a:rPr lang="de-CH" dirty="0"/>
+                <a:rPr lang="de-CH"/>
                 <a:t> </a:t>
               </a:r>
               <a:r>
-                <a:rPr lang="de-CH" dirty="0" err="1"/>
+                <a:rPr lang="de-CH" err="1"/>
                 <a:t>pedstrainAndRoute</a:t>
               </a:r>
               <a:r>
-                <a:rPr lang="de-CH" dirty="0"/>
+                <a:rPr lang="de-CH"/>
                 <a:t>: </a:t>
               </a:r>
               <a:r>
-                <a:rPr lang="de-CH" dirty="0" err="1"/>
+                <a:rPr lang="de-CH" err="1"/>
                 <a:t>HashMap</a:t>
               </a:r>
-              <a:endParaRPr lang="de-CH" dirty="0"/>
+              <a:endParaRPr lang="de-CH"/>
             </a:p>
             <a:p>
               <a:pPr>
@@ -6195,22 +6324,22 @@
                 <a:buChar char="-"/>
               </a:pPr>
               <a:r>
-                <a:rPr lang="de-CH" dirty="0"/>
+                <a:rPr lang="de-CH"/>
                 <a:t> </a:t>
               </a:r>
               <a:r>
-                <a:rPr lang="de-CH" dirty="0" err="1"/>
+                <a:rPr lang="de-CH" err="1"/>
                 <a:t>publicTrafficAndRoute</a:t>
               </a:r>
               <a:r>
-                <a:rPr lang="de-CH" dirty="0"/>
+                <a:rPr lang="de-CH"/>
                 <a:t>: </a:t>
               </a:r>
               <a:r>
-                <a:rPr lang="de-CH" dirty="0" err="1"/>
+                <a:rPr lang="de-CH" err="1"/>
                 <a:t>HashMap</a:t>
               </a:r>
-              <a:endParaRPr lang="de-CH" dirty="0"/>
+              <a:endParaRPr lang="de-CH"/>
             </a:p>
             <a:p>
               <a:pPr>
@@ -6218,23 +6347,23 @@
                 <a:buChar char="-"/>
               </a:pPr>
               <a:r>
-                <a:rPr lang="de-CH" dirty="0"/>
+                <a:rPr lang="de-CH"/>
                 <a:t> </a:t>
               </a:r>
               <a:r>
-                <a:rPr lang="de-CH" dirty="0" err="1"/>
+                <a:rPr lang="de-CH" err="1"/>
                 <a:t>allowedLightTable</a:t>
               </a:r>
               <a:r>
-                <a:rPr lang="de-CH" dirty="0"/>
+                <a:rPr lang="de-CH"/>
                 <a:t> : </a:t>
               </a:r>
               <a:r>
-                <a:rPr lang="de-CH" dirty="0" err="1"/>
+                <a:rPr lang="de-CH" err="1"/>
                 <a:t>int</a:t>
               </a:r>
               <a:r>
-                <a:rPr lang="de-CH" dirty="0"/>
+                <a:rPr lang="de-CH"/>
                 <a:t>[][]</a:t>
               </a:r>
             </a:p>
@@ -6268,25 +6397,25 @@
             <a:lstStyle/>
             <a:p>
               <a:r>
-                <a:rPr lang="de-CH" i="1" dirty="0"/>
+                <a:rPr lang="de-CH" i="1"/>
                 <a:t>+ Algorithmus()</a:t>
               </a:r>
             </a:p>
             <a:p>
               <a:r>
-                <a:rPr lang="de-CH" dirty="0"/>
+                <a:rPr lang="de-CH"/>
                 <a:t>+ </a:t>
               </a:r>
               <a:r>
-                <a:rPr lang="de-CH" dirty="0" err="1"/>
+                <a:rPr lang="de-CH" err="1"/>
                 <a:t>setCrossroadSetting</a:t>
               </a:r>
               <a:r>
-                <a:rPr lang="de-CH" dirty="0"/>
+                <a:rPr lang="de-CH"/>
                 <a:t>(</a:t>
               </a:r>
               <a:r>
-                <a:rPr lang="de-CH" dirty="0">
+                <a:rPr lang="de-CH">
                   <a:solidFill>
                     <a:srgbClr val="FF0000"/>
                   </a:solidFill>
@@ -6294,25 +6423,25 @@
                 <a:t>«?Parameter?»</a:t>
               </a:r>
               <a:r>
-                <a:rPr lang="de-CH" dirty="0"/>
+                <a:rPr lang="de-CH"/>
                 <a:t>)</a:t>
               </a:r>
             </a:p>
             <a:p>
               <a:r>
-                <a:rPr lang="de-CH" dirty="0"/>
+                <a:rPr lang="de-CH"/>
                 <a:t>+ </a:t>
               </a:r>
               <a:r>
-                <a:rPr lang="de-CH" dirty="0" err="1"/>
+                <a:rPr lang="de-CH" err="1"/>
                 <a:t>startSimulate</a:t>
               </a:r>
               <a:r>
-                <a:rPr lang="de-CH" dirty="0"/>
+                <a:rPr lang="de-CH"/>
                 <a:t>(</a:t>
               </a:r>
               <a:r>
-                <a:rPr lang="de-CH" dirty="0">
+                <a:rPr lang="de-CH">
                   <a:solidFill>
                     <a:srgbClr val="FF0000"/>
                   </a:solidFill>
@@ -6320,39 +6449,39 @@
                 <a:t>«?Parameter?»</a:t>
               </a:r>
               <a:r>
-                <a:rPr lang="de-CH" dirty="0"/>
+                <a:rPr lang="de-CH"/>
                 <a:t>)</a:t>
               </a:r>
             </a:p>
             <a:p>
               <a:r>
-                <a:rPr lang="de-CH" dirty="0"/>
+                <a:rPr lang="de-CH"/>
                 <a:t>+ </a:t>
               </a:r>
               <a:r>
-                <a:rPr lang="de-CH" dirty="0" err="1"/>
+                <a:rPr lang="de-CH" err="1"/>
                 <a:t>stoppSimulate</a:t>
               </a:r>
               <a:r>
-                <a:rPr lang="de-CH" dirty="0"/>
+                <a:rPr lang="de-CH"/>
                 <a:t>()</a:t>
               </a:r>
             </a:p>
             <a:p>
               <a:r>
-                <a:rPr lang="de-CH" dirty="0"/>
+                <a:rPr lang="de-CH"/>
                 <a:t>+ </a:t>
               </a:r>
               <a:r>
-                <a:rPr lang="de-CH" dirty="0" err="1"/>
+                <a:rPr lang="de-CH" err="1"/>
                 <a:t>createNewCar</a:t>
               </a:r>
               <a:r>
-                <a:rPr lang="de-CH" dirty="0"/>
+                <a:rPr lang="de-CH"/>
                 <a:t>(</a:t>
               </a:r>
               <a:r>
-                <a:rPr lang="de-CH" dirty="0">
+                <a:rPr lang="de-CH">
                   <a:solidFill>
                     <a:srgbClr val="FF0000"/>
                   </a:solidFill>
@@ -6360,7 +6489,7 @@
                 <a:t>«</a:t>
               </a:r>
               <a:r>
-                <a:rPr lang="de-CH" dirty="0" err="1">
+                <a:rPr lang="de-CH" err="1">
                   <a:solidFill>
                     <a:srgbClr val="FF0000"/>
                   </a:solidFill>
@@ -6368,7 +6497,7 @@
                 <a:t>PosAndSettings</a:t>
               </a:r>
               <a:r>
-                <a:rPr lang="de-CH" dirty="0">
+                <a:rPr lang="de-CH">
                   <a:solidFill>
                     <a:srgbClr val="FF0000"/>
                   </a:solidFill>
@@ -6376,25 +6505,25 @@
                 <a:t>»</a:t>
               </a:r>
               <a:r>
-                <a:rPr lang="de-CH" dirty="0"/>
+                <a:rPr lang="de-CH"/>
                 <a:t>)</a:t>
               </a:r>
             </a:p>
             <a:p>
               <a:r>
-                <a:rPr lang="de-CH" dirty="0"/>
+                <a:rPr lang="de-CH"/>
                 <a:t>+ </a:t>
               </a:r>
               <a:r>
-                <a:rPr lang="de-CH" dirty="0" err="1"/>
+                <a:rPr lang="de-CH" err="1"/>
                 <a:t>createNewPedstrain</a:t>
               </a:r>
               <a:r>
-                <a:rPr lang="de-CH" dirty="0"/>
+                <a:rPr lang="de-CH"/>
                 <a:t>(</a:t>
               </a:r>
               <a:r>
-                <a:rPr lang="de-CH" dirty="0">
+                <a:rPr lang="de-CH">
                   <a:solidFill>
                     <a:srgbClr val="FF0000"/>
                   </a:solidFill>
@@ -6402,7 +6531,7 @@
                 <a:t>«</a:t>
               </a:r>
               <a:r>
-                <a:rPr lang="de-CH" dirty="0" err="1">
+                <a:rPr lang="de-CH" err="1">
                   <a:solidFill>
                     <a:srgbClr val="FF0000"/>
                   </a:solidFill>
@@ -6410,7 +6539,7 @@
                 <a:t>PosAndSettings</a:t>
               </a:r>
               <a:r>
-                <a:rPr lang="de-CH" dirty="0">
+                <a:rPr lang="de-CH">
                   <a:solidFill>
                     <a:srgbClr val="FF0000"/>
                   </a:solidFill>
@@ -6418,25 +6547,25 @@
                 <a:t>»</a:t>
               </a:r>
               <a:r>
-                <a:rPr lang="de-CH" dirty="0"/>
+                <a:rPr lang="de-CH"/>
                 <a:t>)</a:t>
               </a:r>
             </a:p>
             <a:p>
               <a:r>
-                <a:rPr lang="de-CH" dirty="0"/>
+                <a:rPr lang="de-CH"/>
                 <a:t>+ </a:t>
               </a:r>
               <a:r>
-                <a:rPr lang="de-CH" dirty="0" err="1"/>
+                <a:rPr lang="de-CH" err="1"/>
                 <a:t>createNewPublicTraffic</a:t>
               </a:r>
               <a:r>
-                <a:rPr lang="de-CH" dirty="0"/>
+                <a:rPr lang="de-CH"/>
                 <a:t>(</a:t>
               </a:r>
               <a:r>
-                <a:rPr lang="de-CH" dirty="0">
+                <a:rPr lang="de-CH">
                   <a:solidFill>
                     <a:srgbClr val="FF0000"/>
                   </a:solidFill>
@@ -6444,7 +6573,7 @@
                 <a:t>«</a:t>
               </a:r>
               <a:r>
-                <a:rPr lang="de-CH" dirty="0" err="1">
+                <a:rPr lang="de-CH" err="1">
                   <a:solidFill>
                     <a:srgbClr val="FF0000"/>
                   </a:solidFill>
@@ -6452,7 +6581,7 @@
                 <a:t>PosAndSettings</a:t>
               </a:r>
               <a:r>
-                <a:rPr lang="de-CH" dirty="0">
+                <a:rPr lang="de-CH">
                   <a:solidFill>
                     <a:srgbClr val="FF0000"/>
                   </a:solidFill>
@@ -6460,39 +6589,39 @@
                 <a:t>»</a:t>
               </a:r>
               <a:r>
-                <a:rPr lang="de-CH" dirty="0"/>
+                <a:rPr lang="de-CH"/>
                 <a:t>)</a:t>
               </a:r>
             </a:p>
             <a:p>
               <a:r>
-                <a:rPr lang="de-CH" dirty="0"/>
+                <a:rPr lang="de-CH"/>
                 <a:t>+ </a:t>
               </a:r>
               <a:r>
-                <a:rPr lang="de-CH" dirty="0" err="1"/>
+                <a:rPr lang="de-CH" err="1"/>
                 <a:t>accident</a:t>
               </a:r>
               <a:r>
-                <a:rPr lang="de-CH" dirty="0"/>
+                <a:rPr lang="de-CH"/>
                 <a:t>()</a:t>
               </a:r>
             </a:p>
             <a:p>
               <a:r>
-                <a:rPr lang="de-CH" dirty="0"/>
+                <a:rPr lang="de-CH"/>
                 <a:t>+ </a:t>
               </a:r>
               <a:r>
-                <a:rPr lang="de-CH" dirty="0" err="1"/>
+                <a:rPr lang="de-CH" err="1"/>
                 <a:t>clearCrossroad</a:t>
               </a:r>
               <a:r>
-                <a:rPr lang="de-CH" dirty="0"/>
+                <a:rPr lang="de-CH"/>
                 <a:t>(</a:t>
               </a:r>
               <a:r>
-                <a:rPr lang="de-CH" dirty="0">
+                <a:rPr lang="de-CH">
                   <a:solidFill>
                     <a:srgbClr val="FF0000"/>
                   </a:solidFill>
@@ -6500,13 +6629,13 @@
                 <a:t>«Parameter?»</a:t>
               </a:r>
               <a:r>
-                <a:rPr lang="de-CH" dirty="0"/>
+                <a:rPr lang="de-CH"/>
                 <a:t>)</a:t>
               </a:r>
             </a:p>
             <a:p>
               <a:r>
-                <a:rPr lang="de-CH" dirty="0">
+                <a:rPr lang="de-CH">
                   <a:solidFill>
                     <a:srgbClr val="FF0000"/>
                   </a:solidFill>
@@ -6572,18 +6701,18 @@
             <a:p>
               <a:pPr algn="ctr"/>
               <a:r>
-                <a:rPr lang="de-CH" dirty="0" err="1"/>
+                <a:rPr lang="de-CH" err="1"/>
                 <a:t>class</a:t>
               </a:r>
               <a:r>
-                <a:rPr lang="de-CH" dirty="0"/>
+                <a:rPr lang="de-CH"/>
                 <a:t> </a:t>
               </a:r>
               <a:r>
-                <a:rPr lang="de-CH" dirty="0" err="1"/>
+                <a:rPr lang="de-CH" err="1"/>
                 <a:t>TrafficLight</a:t>
               </a:r>
-              <a:endParaRPr lang="de-CH" dirty="0"/>
+              <a:endParaRPr lang="de-CH"/>
             </a:p>
           </p:txBody>
         </p:sp>
@@ -6747,92 +6876,92 @@
             <a:lstStyle/>
             <a:p>
               <a:r>
-                <a:rPr lang="de-CH" i="1" dirty="0"/>
+                <a:rPr lang="de-CH" i="1"/>
                 <a:t>+ </a:t>
               </a:r>
               <a:r>
-                <a:rPr lang="de-CH" i="1" dirty="0" err="1"/>
+                <a:rPr lang="de-CH" i="1" err="1"/>
                 <a:t>Trafficlight</a:t>
               </a:r>
               <a:r>
-                <a:rPr lang="de-CH" i="1" dirty="0"/>
+                <a:rPr lang="de-CH" i="1"/>
                 <a:t>()</a:t>
               </a:r>
             </a:p>
             <a:p>
               <a:r>
-                <a:rPr lang="de-CH" dirty="0"/>
+                <a:rPr lang="de-CH"/>
                 <a:t>+ </a:t>
               </a:r>
               <a:r>
-                <a:rPr lang="de-CH" dirty="0" err="1"/>
+                <a:rPr lang="de-CH" err="1"/>
                 <a:t>setFlashYellow</a:t>
               </a:r>
               <a:r>
-                <a:rPr lang="de-CH" dirty="0"/>
+                <a:rPr lang="de-CH"/>
                 <a:t> ()</a:t>
               </a:r>
             </a:p>
             <a:p>
               <a:r>
-                <a:rPr lang="de-CH" dirty="0"/>
+                <a:rPr lang="de-CH"/>
                 <a:t>+ </a:t>
               </a:r>
               <a:r>
-                <a:rPr lang="de-CH" dirty="0" err="1"/>
+                <a:rPr lang="de-CH" err="1"/>
                 <a:t>setRed</a:t>
               </a:r>
               <a:r>
-                <a:rPr lang="de-CH" dirty="0"/>
+                <a:rPr lang="de-CH"/>
                 <a:t> ()</a:t>
               </a:r>
             </a:p>
             <a:p>
               <a:r>
-                <a:rPr lang="de-CH" dirty="0"/>
+                <a:rPr lang="de-CH"/>
                 <a:t>+ </a:t>
               </a:r>
               <a:r>
-                <a:rPr lang="de-CH" dirty="0" err="1"/>
+                <a:rPr lang="de-CH" err="1"/>
                 <a:t>setGreen</a:t>
               </a:r>
               <a:r>
-                <a:rPr lang="de-CH" dirty="0"/>
+                <a:rPr lang="de-CH"/>
                 <a:t>()</a:t>
               </a:r>
             </a:p>
             <a:p>
               <a:r>
-                <a:rPr lang="de-CH" dirty="0"/>
+                <a:rPr lang="de-CH"/>
                 <a:t>+ </a:t>
               </a:r>
               <a:r>
-                <a:rPr lang="de-CH" dirty="0" err="1"/>
+                <a:rPr lang="de-CH" err="1"/>
                 <a:t>setSettings</a:t>
               </a:r>
               <a:r>
-                <a:rPr lang="de-CH" dirty="0"/>
+                <a:rPr lang="de-CH"/>
                 <a:t>()</a:t>
               </a:r>
             </a:p>
             <a:p>
               <a:r>
-                <a:rPr lang="de-CH" dirty="0"/>
+                <a:rPr lang="de-CH"/>
                 <a:t>+ </a:t>
               </a:r>
               <a:r>
-                <a:rPr lang="de-CH" dirty="0" err="1"/>
+                <a:rPr lang="de-CH" err="1"/>
                 <a:t>getState</a:t>
               </a:r>
               <a:r>
-                <a:rPr lang="de-CH" dirty="0"/>
+                <a:rPr lang="de-CH"/>
                 <a:t>() : </a:t>
               </a:r>
               <a:r>
-                <a:rPr lang="de-CH" dirty="0" err="1"/>
+                <a:rPr lang="de-CH" err="1"/>
                 <a:t>int</a:t>
               </a:r>
-              <a:endParaRPr lang="de-CH" dirty="0"/>
+              <a:endParaRPr lang="de-CH"/>
             </a:p>
           </p:txBody>
         </p:sp>
@@ -6892,18 +7021,18 @@
             <a:p>
               <a:pPr algn="ctr"/>
               <a:r>
-                <a:rPr lang="de-CH" dirty="0" err="1"/>
+                <a:rPr lang="de-CH" err="1"/>
                 <a:t>class</a:t>
               </a:r>
               <a:r>
-                <a:rPr lang="de-CH" dirty="0"/>
+                <a:rPr lang="de-CH"/>
                 <a:t> </a:t>
               </a:r>
               <a:r>
-                <a:rPr lang="de-CH" dirty="0" err="1"/>
+                <a:rPr lang="de-CH" err="1"/>
                 <a:t>GuiCrossroad</a:t>
               </a:r>
-              <a:endParaRPr lang="de-CH" dirty="0"/>
+              <a:endParaRPr lang="de-CH"/>
             </a:p>
           </p:txBody>
         </p:sp>
@@ -6945,27 +7074,27 @@
                 <a:buChar char="-"/>
               </a:pPr>
               <a:r>
-                <a:rPr lang="de-CH" dirty="0"/>
+                <a:rPr lang="de-CH"/>
                 <a:t> </a:t>
               </a:r>
               <a:r>
-                <a:rPr lang="de-CH" dirty="0" err="1"/>
+                <a:rPr lang="de-CH" err="1"/>
                 <a:t>trafficLights</a:t>
               </a:r>
               <a:r>
-                <a:rPr lang="de-CH" dirty="0"/>
+                <a:rPr lang="de-CH"/>
                 <a:t> : </a:t>
               </a:r>
               <a:r>
-                <a:rPr lang="de-CH" dirty="0" err="1"/>
+                <a:rPr lang="de-CH" err="1"/>
                 <a:t>HashMap</a:t>
               </a:r>
               <a:r>
-                <a:rPr lang="de-CH" dirty="0"/>
+                <a:rPr lang="de-CH"/>
                 <a:t>	</a:t>
               </a:r>
               <a:r>
-                <a:rPr lang="de-CH" dirty="0">
+                <a:rPr lang="de-CH">
                   <a:solidFill>
                     <a:srgbClr val="FF0000"/>
                   </a:solidFill>
@@ -6973,7 +7102,7 @@
                 <a:t>(</a:t>
               </a:r>
               <a:r>
-                <a:rPr lang="de-CH" dirty="0" err="1">
+                <a:rPr lang="de-CH" err="1">
                   <a:solidFill>
                     <a:srgbClr val="FF0000"/>
                   </a:solidFill>
@@ -6981,7 +7110,7 @@
                 <a:t>int</a:t>
               </a:r>
               <a:r>
-                <a:rPr lang="de-CH" dirty="0">
+                <a:rPr lang="de-CH">
                   <a:solidFill>
                     <a:srgbClr val="FF0000"/>
                   </a:solidFill>
@@ -6989,7 +7118,7 @@
                 <a:t> </a:t>
               </a:r>
               <a:r>
-                <a:rPr lang="de-CH" dirty="0" err="1">
+                <a:rPr lang="de-CH" err="1">
                   <a:solidFill>
                     <a:srgbClr val="FF0000"/>
                   </a:solidFill>
@@ -6997,7 +7126,7 @@
                 <a:t>id</a:t>
               </a:r>
               <a:r>
-                <a:rPr lang="de-CH" dirty="0">
+                <a:rPr lang="de-CH">
                   <a:solidFill>
                     <a:srgbClr val="FF0000"/>
                   </a:solidFill>
@@ -7005,7 +7134,7 @@
                 <a:t>, </a:t>
               </a:r>
               <a:r>
-                <a:rPr lang="de-CH" dirty="0" err="1">
+                <a:rPr lang="de-CH" err="1">
                   <a:solidFill>
                     <a:srgbClr val="FF0000"/>
                   </a:solidFill>
@@ -7013,7 +7142,7 @@
                 <a:t>class</a:t>
               </a:r>
               <a:r>
-                <a:rPr lang="de-CH" dirty="0">
+                <a:rPr lang="de-CH">
                   <a:solidFill>
                     <a:srgbClr val="FF0000"/>
                   </a:solidFill>
@@ -7021,7 +7150,7 @@
                 <a:t> </a:t>
               </a:r>
               <a:r>
-                <a:rPr lang="de-CH" dirty="0" err="1">
+                <a:rPr lang="de-CH" err="1">
                   <a:solidFill>
                     <a:srgbClr val="FF0000"/>
                   </a:solidFill>
@@ -7029,7 +7158,7 @@
                 <a:t>TrafficLight</a:t>
               </a:r>
               <a:r>
-                <a:rPr lang="de-CH" dirty="0">
+                <a:rPr lang="de-CH">
                   <a:solidFill>
                     <a:srgbClr val="FF0000"/>
                   </a:solidFill>
@@ -7043,15 +7172,15 @@
                 <a:buChar char="-"/>
               </a:pPr>
               <a:r>
-                <a:rPr lang="de-CH" dirty="0"/>
+                <a:rPr lang="de-CH"/>
                 <a:t> </a:t>
               </a:r>
               <a:r>
-                <a:rPr lang="de-CH" dirty="0" err="1"/>
+                <a:rPr lang="de-CH" err="1"/>
                 <a:t>picture</a:t>
               </a:r>
               <a:r>
-                <a:rPr lang="de-CH" dirty="0"/>
+                <a:rPr lang="de-CH"/>
                 <a:t>: String</a:t>
               </a:r>
             </a:p>
@@ -7091,221 +7220,221 @@
             <a:lstStyle/>
             <a:p>
               <a:r>
-                <a:rPr lang="de-CH" i="1" dirty="0"/>
+                <a:rPr lang="de-CH" i="1"/>
                 <a:t>+ </a:t>
               </a:r>
               <a:r>
-                <a:rPr lang="de-CH" i="1" dirty="0" err="1"/>
+                <a:rPr lang="de-CH" i="1" err="1"/>
                 <a:t>GuiCrossroad</a:t>
               </a:r>
               <a:r>
-                <a:rPr lang="de-CH" i="1" dirty="0"/>
+                <a:rPr lang="de-CH" i="1"/>
                 <a:t>(</a:t>
               </a:r>
               <a:r>
-                <a:rPr lang="de-CH" i="1" dirty="0" err="1"/>
+                <a:rPr lang="de-CH" i="1" err="1"/>
                 <a:t>countOfRoutes</a:t>
               </a:r>
               <a:r>
-                <a:rPr lang="de-CH" i="1" dirty="0"/>
+                <a:rPr lang="de-CH" i="1"/>
                 <a:t> : </a:t>
               </a:r>
               <a:r>
-                <a:rPr lang="de-CH" i="1" dirty="0" err="1"/>
+                <a:rPr lang="de-CH" i="1" err="1"/>
                 <a:t>int</a:t>
               </a:r>
               <a:r>
-                <a:rPr lang="de-CH" i="1" dirty="0"/>
+                <a:rPr lang="de-CH" i="1"/>
                 <a:t>)</a:t>
               </a:r>
             </a:p>
             <a:p>
               <a:r>
-                <a:rPr lang="de-CH" dirty="0"/>
+                <a:rPr lang="de-CH"/>
                 <a:t>+ </a:t>
               </a:r>
               <a:r>
-                <a:rPr lang="de-CH" dirty="0" err="1"/>
+                <a:rPr lang="de-CH" err="1"/>
                 <a:t>selectCrossroad</a:t>
               </a:r>
               <a:r>
-                <a:rPr lang="de-CH" dirty="0"/>
+                <a:rPr lang="de-CH"/>
                 <a:t>() : </a:t>
               </a:r>
               <a:r>
-                <a:rPr lang="de-CH" dirty="0" err="1"/>
+                <a:rPr lang="de-CH" err="1"/>
                 <a:t>int</a:t>
               </a:r>
-              <a:endParaRPr lang="de-CH" dirty="0"/>
+              <a:endParaRPr lang="de-CH"/>
             </a:p>
             <a:p>
               <a:r>
-                <a:rPr lang="de-CH" dirty="0"/>
+                <a:rPr lang="de-CH"/>
                 <a:t>+ </a:t>
               </a:r>
               <a:r>
-                <a:rPr lang="de-CH" dirty="0" err="1"/>
+                <a:rPr lang="de-CH" err="1"/>
                 <a:t>drawCrossroad</a:t>
               </a:r>
               <a:r>
-                <a:rPr lang="de-CH" dirty="0"/>
+                <a:rPr lang="de-CH"/>
                 <a:t>()</a:t>
               </a:r>
             </a:p>
             <a:p>
               <a:r>
-                <a:rPr lang="de-CH" dirty="0"/>
+                <a:rPr lang="de-CH"/>
                 <a:t>+ </a:t>
               </a:r>
               <a:r>
-                <a:rPr lang="de-CH" dirty="0" err="1"/>
+                <a:rPr lang="de-CH" err="1"/>
                 <a:t>drawCarOrPublicTraffic</a:t>
               </a:r>
               <a:r>
-                <a:rPr lang="de-CH" dirty="0"/>
+                <a:rPr lang="de-CH"/>
                 <a:t>(</a:t>
               </a:r>
               <a:r>
-                <a:rPr lang="de-CH" dirty="0" err="1"/>
+                <a:rPr lang="de-CH" err="1"/>
                 <a:t>car</a:t>
               </a:r>
               <a:r>
-                <a:rPr lang="de-CH" dirty="0"/>
+                <a:rPr lang="de-CH"/>
                 <a:t> : </a:t>
               </a:r>
               <a:r>
-                <a:rPr lang="de-CH" dirty="0" err="1"/>
+                <a:rPr lang="de-CH" err="1"/>
                 <a:t>class</a:t>
               </a:r>
               <a:r>
-                <a:rPr lang="de-CH" dirty="0"/>
+                <a:rPr lang="de-CH"/>
                 <a:t>)</a:t>
               </a:r>
             </a:p>
             <a:p>
               <a:r>
-                <a:rPr lang="de-CH" dirty="0"/>
+                <a:rPr lang="de-CH"/>
                 <a:t>+ </a:t>
               </a:r>
               <a:r>
-                <a:rPr lang="de-CH" dirty="0" err="1"/>
+                <a:rPr lang="de-CH" err="1"/>
                 <a:t>drawPedstrain</a:t>
               </a:r>
               <a:r>
-                <a:rPr lang="de-CH" dirty="0"/>
+                <a:rPr lang="de-CH"/>
                 <a:t>(</a:t>
               </a:r>
               <a:r>
-                <a:rPr lang="de-CH" dirty="0" err="1"/>
+                <a:rPr lang="de-CH" err="1"/>
                 <a:t>pedstrain</a:t>
               </a:r>
               <a:r>
-                <a:rPr lang="de-CH" dirty="0"/>
+                <a:rPr lang="de-CH"/>
                 <a:t> : </a:t>
               </a:r>
               <a:r>
-                <a:rPr lang="de-CH" dirty="0" err="1"/>
+                <a:rPr lang="de-CH" err="1"/>
                 <a:t>class</a:t>
               </a:r>
               <a:r>
-                <a:rPr lang="de-CH" dirty="0"/>
+                <a:rPr lang="de-CH"/>
                 <a:t>)</a:t>
               </a:r>
             </a:p>
             <a:p>
               <a:r>
-                <a:rPr lang="de-CH" dirty="0"/>
+                <a:rPr lang="de-CH"/>
                 <a:t>+ </a:t>
               </a:r>
               <a:r>
-                <a:rPr lang="de-CH" dirty="0" err="1"/>
+                <a:rPr lang="de-CH" err="1"/>
                 <a:t>updateTrafficLights</a:t>
               </a:r>
               <a:r>
-                <a:rPr lang="de-CH" dirty="0"/>
+                <a:rPr lang="de-CH"/>
                 <a:t>(</a:t>
               </a:r>
               <a:r>
-                <a:rPr lang="de-CH" dirty="0" err="1"/>
+                <a:rPr lang="de-CH" err="1"/>
                 <a:t>actLightId</a:t>
               </a:r>
               <a:r>
-                <a:rPr lang="de-CH" dirty="0"/>
+                <a:rPr lang="de-CH"/>
                 <a:t> : </a:t>
               </a:r>
               <a:r>
-                <a:rPr lang="de-CH" dirty="0" err="1"/>
+                <a:rPr lang="de-CH" err="1"/>
                 <a:t>int</a:t>
               </a:r>
               <a:r>
-                <a:rPr lang="de-CH" dirty="0"/>
+                <a:rPr lang="de-CH"/>
                 <a:t>, </a:t>
               </a:r>
               <a:r>
-                <a:rPr lang="de-CH" dirty="0" err="1"/>
+                <a:rPr lang="de-CH" err="1"/>
                 <a:t>allowedLightTable</a:t>
               </a:r>
               <a:r>
-                <a:rPr lang="de-CH" dirty="0"/>
+                <a:rPr lang="de-CH"/>
                 <a:t> : </a:t>
               </a:r>
               <a:r>
-                <a:rPr lang="de-CH" dirty="0" err="1"/>
+                <a:rPr lang="de-CH" err="1"/>
                 <a:t>int</a:t>
               </a:r>
               <a:r>
-                <a:rPr lang="de-CH" dirty="0"/>
+                <a:rPr lang="de-CH"/>
                 <a:t>[][]) : </a:t>
               </a:r>
               <a:r>
-                <a:rPr lang="de-CH" dirty="0" err="1"/>
+                <a:rPr lang="de-CH" err="1"/>
                 <a:t>int</a:t>
               </a:r>
-              <a:endParaRPr lang="de-CH" dirty="0"/>
+              <a:endParaRPr lang="de-CH"/>
             </a:p>
             <a:p>
               <a:r>
-                <a:rPr lang="de-CH" dirty="0"/>
+                <a:rPr lang="de-CH"/>
                 <a:t>+ </a:t>
               </a:r>
               <a:r>
-                <a:rPr lang="de-CH" dirty="0" err="1"/>
+                <a:rPr lang="de-CH" err="1"/>
                 <a:t>updateCrossroad</a:t>
               </a:r>
               <a:r>
-                <a:rPr lang="de-CH" dirty="0"/>
+                <a:rPr lang="de-CH"/>
                 <a:t>(</a:t>
               </a:r>
               <a:r>
-                <a:rPr lang="de-CH" dirty="0" err="1"/>
+                <a:rPr lang="de-CH" err="1"/>
                 <a:t>carsAndRoute</a:t>
               </a:r>
               <a:r>
-                <a:rPr lang="de-CH" dirty="0"/>
+                <a:rPr lang="de-CH"/>
                 <a:t> : </a:t>
               </a:r>
               <a:r>
-                <a:rPr lang="de-CH" dirty="0" err="1"/>
+                <a:rPr lang="de-CH" err="1"/>
                 <a:t>HashMap</a:t>
               </a:r>
               <a:r>
-                <a:rPr lang="de-CH" dirty="0"/>
+                <a:rPr lang="de-CH"/>
                 <a:t>, </a:t>
               </a:r>
               <a:r>
-                <a:rPr lang="de-CH" dirty="0" err="1"/>
+                <a:rPr lang="de-CH" err="1"/>
                 <a:t>pedstrainAndRoute</a:t>
               </a:r>
               <a:r>
-                <a:rPr lang="de-CH" dirty="0"/>
+                <a:rPr lang="de-CH"/>
                 <a:t> : </a:t>
               </a:r>
               <a:r>
-                <a:rPr lang="de-CH" dirty="0" err="1"/>
+                <a:rPr lang="de-CH" err="1"/>
                 <a:t>HashMap</a:t>
               </a:r>
               <a:r>
-                <a:rPr lang="de-CH" dirty="0"/>
+                <a:rPr lang="de-CH"/>
                 <a:t>)</a:t>
               </a:r>
             </a:p>
@@ -7376,7 +7505,7 @@
               </a:r>
               <a:r>
                 <a:rPr lang="de-CH" dirty="0" err="1"/>
-                <a:t>PublicTraffic</a:t>
+                <a:t>PublicTransport</a:t>
               </a:r>
               <a:endParaRPr lang="de-CH" dirty="0"/>
             </a:p>
@@ -7420,10 +7549,10 @@
                 <a:buChar char="-"/>
               </a:pPr>
               <a:r>
-                <a:rPr lang="de-CH" dirty="0" err="1"/>
+                <a:rPr lang="de-CH" err="1"/>
                 <a:t>tbd</a:t>
               </a:r>
-              <a:endParaRPr lang="de-CH" dirty="0"/>
+              <a:endParaRPr lang="de-CH"/>
             </a:p>
           </p:txBody>
         </p:sp>
@@ -7461,25 +7590,25 @@
             <a:lstStyle/>
             <a:p>
               <a:r>
-                <a:rPr lang="de-CH" i="1" dirty="0"/>
+                <a:rPr lang="de-CH" i="1"/>
                 <a:t>+ </a:t>
               </a:r>
               <a:r>
-                <a:rPr lang="de-CH" i="1" dirty="0" err="1"/>
+                <a:rPr lang="de-CH" i="1" err="1"/>
                 <a:t>PublicTraffic</a:t>
               </a:r>
               <a:r>
-                <a:rPr lang="de-CH" i="1" dirty="0"/>
+                <a:rPr lang="de-CH" i="1"/>
                 <a:t>()</a:t>
               </a:r>
             </a:p>
             <a:p>
               <a:r>
-                <a:rPr lang="de-CH" i="1" dirty="0"/>
+                <a:rPr lang="de-CH" i="1"/>
                 <a:t>+ </a:t>
               </a:r>
               <a:r>
-                <a:rPr lang="de-CH" i="1" dirty="0">
+                <a:rPr lang="de-CH" i="1">
                   <a:solidFill>
                     <a:srgbClr val="FF0000"/>
                   </a:solidFill>
@@ -7488,7 +7617,7 @@
               </a:r>
             </a:p>
             <a:p>
-              <a:endParaRPr lang="de-CH" i="1" dirty="0"/>
+              <a:endParaRPr lang="de-CH" i="1"/>
             </a:p>
           </p:txBody>
         </p:sp>
@@ -7507,10 +7636,10 @@
         </p:nvGrpSpPr>
         <p:grpSpPr>
           <a:xfrm>
-            <a:off x="-11447931" y="997268"/>
-            <a:ext cx="9059069" cy="2217978"/>
+            <a:off x="-19772781" y="-2119514"/>
+            <a:ext cx="9059069" cy="1663980"/>
             <a:chOff x="2001806" y="1724764"/>
-            <a:chExt cx="4572032" cy="2217978"/>
+            <a:chExt cx="4572032" cy="1663980"/>
           </a:xfrm>
         </p:grpSpPr>
         <p:sp>
@@ -7548,6 +7677,10 @@
             <a:p>
               <a:pPr algn="ctr"/>
               <a:r>
+                <a:rPr lang="de-CH" dirty="0"/>
+                <a:t>Abstract </a:t>
+              </a:r>
+              <a:r>
                 <a:rPr lang="de-CH" dirty="0" err="1"/>
                 <a:t>class</a:t>
               </a:r>
@@ -7557,7 +7690,7 @@
               </a:r>
               <a:r>
                 <a:rPr lang="de-CH" dirty="0" err="1"/>
-                <a:t>Pedstrain</a:t>
+                <a:t>objectPosition</a:t>
               </a:r>
               <a:endParaRPr lang="de-CH" dirty="0"/>
             </a:p>
@@ -7628,15 +7761,7 @@
               </a:r>
               <a:r>
                 <a:rPr lang="de-CH" dirty="0"/>
-                <a:t>: </a:t>
-              </a:r>
-              <a:r>
-                <a:rPr lang="de-CH" dirty="0" err="1"/>
-                <a:t>int</a:t>
-              </a:r>
-              <a:r>
-                <a:rPr lang="de-CH" dirty="0"/>
-                <a:t>[2][3]</a:t>
+                <a:t>: Point</a:t>
               </a:r>
             </a:p>
           </p:txBody>
@@ -7656,7 +7781,7 @@
           <p:spPr>
             <a:xfrm>
               <a:off x="2001806" y="2742413"/>
-              <a:ext cx="4572032" cy="1200329"/>
+              <a:ext cx="4572032" cy="646331"/>
             </a:xfrm>
             <a:prstGeom prst="rect">
               <a:avLst/>
@@ -7680,7 +7805,7 @@
               </a:r>
               <a:r>
                 <a:rPr lang="de-CH" i="1" dirty="0" err="1"/>
-                <a:t>Pedstrain</a:t>
+                <a:t>setActPosition</a:t>
               </a:r>
               <a:r>
                 <a:rPr lang="de-CH" i="1" dirty="0"/>
@@ -7688,67 +7813,11 @@
               </a:r>
               <a:r>
                 <a:rPr lang="de-CH" i="1" dirty="0" err="1"/>
-                <a:t>startposX</a:t>
+                <a:t>position</a:t>
               </a:r>
               <a:r>
                 <a:rPr lang="de-CH" i="1" dirty="0"/>
-                <a:t> : </a:t>
-              </a:r>
-              <a:r>
-                <a:rPr lang="de-CH" i="1" dirty="0" err="1"/>
-                <a:t>int</a:t>
-              </a:r>
-              <a:r>
-                <a:rPr lang="de-CH" i="1" dirty="0"/>
-                <a:t>, </a:t>
-              </a:r>
-              <a:r>
-                <a:rPr lang="de-CH" i="1" dirty="0" err="1"/>
-                <a:t>startposY</a:t>
-              </a:r>
-              <a:r>
-                <a:rPr lang="de-CH" i="1" dirty="0"/>
-                <a:t> : </a:t>
-              </a:r>
-              <a:r>
-                <a:rPr lang="de-CH" i="1" dirty="0" err="1"/>
-                <a:t>int</a:t>
-              </a:r>
-              <a:r>
-                <a:rPr lang="de-CH" i="1" dirty="0"/>
-                <a:t>, </a:t>
-              </a:r>
-              <a:r>
-                <a:rPr lang="de-CH" i="1" dirty="0" err="1"/>
-                <a:t>endposX</a:t>
-              </a:r>
-              <a:r>
-                <a:rPr lang="de-CH" i="1" dirty="0"/>
-                <a:t> : </a:t>
-              </a:r>
-              <a:r>
-                <a:rPr lang="de-CH" i="1" dirty="0" err="1"/>
-                <a:t>int</a:t>
-              </a:r>
-              <a:r>
-                <a:rPr lang="de-CH" i="1" dirty="0"/>
-                <a:t>, </a:t>
-              </a:r>
-              <a:r>
-                <a:rPr lang="de-CH" i="1" dirty="0" err="1"/>
-                <a:t>endposY</a:t>
-              </a:r>
-              <a:r>
-                <a:rPr lang="de-CH" i="1" dirty="0"/>
-                <a:t> : </a:t>
-              </a:r>
-              <a:r>
-                <a:rPr lang="de-CH" i="1" dirty="0" err="1"/>
-                <a:t>int</a:t>
-              </a:r>
-              <a:r>
-                <a:rPr lang="de-CH" i="1" dirty="0"/>
-                <a:t>)</a:t>
+                <a:t>: Point)</a:t>
               </a:r>
             </a:p>
             <a:p>
@@ -7757,128 +7826,12 @@
                 <a:t>+ </a:t>
               </a:r>
               <a:r>
-                <a:rPr lang="de-CH" dirty="0" err="1"/>
-                <a:t>changePedstrainSettings</a:t>
-              </a:r>
-              <a:r>
-                <a:rPr lang="de-CH" dirty="0"/>
-                <a:t>(</a:t>
-              </a:r>
-              <a:r>
-                <a:rPr lang="de-CH" i="1" dirty="0" err="1"/>
-                <a:t>startposX</a:t>
-              </a:r>
-              <a:r>
-                <a:rPr lang="de-CH" i="1" dirty="0"/>
-                <a:t> : </a:t>
-              </a:r>
-              <a:r>
-                <a:rPr lang="de-CH" i="1" dirty="0" err="1"/>
-                <a:t>int</a:t>
-              </a:r>
-              <a:r>
-                <a:rPr lang="de-CH" i="1" dirty="0"/>
-                <a:t>, </a:t>
-              </a:r>
-              <a:r>
-                <a:rPr lang="de-CH" i="1" dirty="0" err="1"/>
-                <a:t>startposY</a:t>
-              </a:r>
-              <a:r>
-                <a:rPr lang="de-CH" i="1" dirty="0"/>
-                <a:t> : </a:t>
-              </a:r>
-              <a:r>
-                <a:rPr lang="de-CH" i="1" dirty="0" err="1"/>
-                <a:t>int</a:t>
-              </a:r>
-              <a:r>
-                <a:rPr lang="de-CH" i="1" dirty="0"/>
-                <a:t>, </a:t>
-              </a:r>
-              <a:r>
-                <a:rPr lang="de-CH" i="1" dirty="0" err="1"/>
-                <a:t>endposX</a:t>
-              </a:r>
-              <a:r>
-                <a:rPr lang="de-CH" i="1" dirty="0"/>
-                <a:t> : </a:t>
-              </a:r>
-              <a:r>
-                <a:rPr lang="de-CH" i="1" dirty="0" err="1"/>
-                <a:t>int</a:t>
-              </a:r>
-              <a:r>
-                <a:rPr lang="de-CH" i="1" dirty="0"/>
-                <a:t>, </a:t>
-              </a:r>
-              <a:r>
-                <a:rPr lang="de-CH" i="1" dirty="0" err="1"/>
-                <a:t>endposY</a:t>
-              </a:r>
-              <a:r>
-                <a:rPr lang="de-CH" i="1" dirty="0"/>
-                <a:t> : </a:t>
-              </a:r>
-              <a:r>
-                <a:rPr lang="de-CH" i="1" dirty="0" err="1"/>
-                <a:t>int</a:t>
-              </a:r>
-              <a:r>
-                <a:rPr lang="de-CH" dirty="0"/>
-                <a:t>)</a:t>
-              </a:r>
-            </a:p>
-            <a:p>
-              <a:r>
-                <a:rPr lang="de-CH" i="1" dirty="0"/>
-                <a:t>+ </a:t>
-              </a:r>
-              <a:r>
-                <a:rPr lang="de-CH" i="1" dirty="0" err="1"/>
-                <a:t>setActPosition</a:t>
-              </a:r>
-              <a:r>
-                <a:rPr lang="de-CH" i="1" dirty="0"/>
-                <a:t>(</a:t>
-              </a:r>
-              <a:r>
-                <a:rPr lang="de-CH" i="1" dirty="0" err="1"/>
-                <a:t>position</a:t>
-              </a:r>
-              <a:r>
-                <a:rPr lang="de-CH" i="1" dirty="0"/>
-                <a:t>: </a:t>
-              </a:r>
-              <a:r>
-                <a:rPr lang="de-CH" i="1" dirty="0" err="1"/>
-                <a:t>int</a:t>
-              </a:r>
-              <a:r>
-                <a:rPr lang="de-CH" i="1" dirty="0"/>
-                <a:t>[2][3]</a:t>
-              </a:r>
-            </a:p>
-            <a:p>
-              <a:r>
-                <a:rPr lang="de-CH" i="1" dirty="0"/>
-                <a:t>+ </a:t>
-              </a:r>
-              <a:r>
                 <a:rPr lang="de-CH" i="1" dirty="0" err="1"/>
                 <a:t>getActPosition</a:t>
               </a:r>
               <a:r>
                 <a:rPr lang="de-CH" i="1" dirty="0"/>
-                <a:t>() : </a:t>
-              </a:r>
-              <a:r>
-                <a:rPr lang="de-CH" i="1" dirty="0" err="1"/>
-                <a:t>int</a:t>
-              </a:r>
-              <a:r>
-                <a:rPr lang="de-CH" i="1" dirty="0"/>
-                <a:t>[1][2]</a:t>
+                <a:t>() : Point</a:t>
               </a:r>
             </a:p>
           </p:txBody>
@@ -8056,7 +8009,7 @@
         </p:nvGrpSpPr>
         <p:grpSpPr>
           <a:xfrm rot="5400000">
-            <a:off x="-2347816" y="1954161"/>
+            <a:off x="-2160734" y="2006429"/>
             <a:ext cx="352400" cy="452140"/>
             <a:chOff x="10542488" y="4562229"/>
             <a:chExt cx="352400" cy="452140"/>
@@ -8298,8 +8251,8 @@
         </p:nvCxnSpPr>
         <p:spPr>
           <a:xfrm flipH="1" flipV="1">
-            <a:off x="-1945547" y="2180232"/>
-            <a:ext cx="5809530" cy="6001143"/>
+            <a:off x="-1758465" y="2232500"/>
+            <a:ext cx="5622448" cy="5948875"/>
           </a:xfrm>
           <a:prstGeom prst="line">
             <a:avLst/>
@@ -8539,9 +8492,9 @@
         <p:grpSpPr>
           <a:xfrm>
             <a:off x="-12635284" y="5090065"/>
-            <a:ext cx="11544421" cy="2168849"/>
+            <a:ext cx="11544421" cy="1660848"/>
             <a:chOff x="2001806" y="1724764"/>
-            <a:chExt cx="4572032" cy="2238834"/>
+            <a:chExt cx="4572032" cy="1714451"/>
           </a:xfrm>
         </p:grpSpPr>
         <p:sp>
@@ -8579,11 +8532,11 @@
             <a:p>
               <a:pPr algn="ctr"/>
               <a:r>
-                <a:rPr lang="de-CH" dirty="0" err="1"/>
+                <a:rPr lang="de-CH" err="1"/>
                 <a:t>class</a:t>
               </a:r>
               <a:r>
-                <a:rPr lang="de-CH" dirty="0"/>
+                <a:rPr lang="de-CH"/>
                 <a:t> Car</a:t>
               </a:r>
             </a:p>
@@ -8604,7 +8557,7 @@
           <p:spPr>
             <a:xfrm>
               <a:off x="2001806" y="2096082"/>
-              <a:ext cx="4572032" cy="1200329"/>
+              <a:ext cx="4572032" cy="667189"/>
             </a:xfrm>
             <a:prstGeom prst="rect">
               <a:avLst/>
@@ -8627,22 +8580,22 @@
                 <a:buChar char="-"/>
               </a:pPr>
               <a:r>
-                <a:rPr lang="de-CH"/>
+                <a:rPr lang="de-CH" dirty="0"/>
                 <a:t> </a:t>
               </a:r>
               <a:r>
-                <a:rPr lang="de-CH" err="1"/>
+                <a:rPr lang="de-CH" dirty="0" err="1"/>
                 <a:t>maxSpeed</a:t>
               </a:r>
               <a:r>
-                <a:rPr lang="de-CH"/>
+                <a:rPr lang="de-CH" dirty="0"/>
                 <a:t>: </a:t>
               </a:r>
               <a:r>
-                <a:rPr lang="de-CH" err="1"/>
+                <a:rPr lang="de-CH" dirty="0" err="1"/>
                 <a:t>int</a:t>
               </a:r>
-              <a:endParaRPr lang="de-CH"/>
+              <a:endParaRPr lang="de-CH" dirty="0"/>
             </a:p>
             <a:p>
               <a:pPr>
@@ -8650,66 +8603,22 @@
                 <a:buChar char="-"/>
               </a:pPr>
               <a:r>
-                <a:rPr lang="de-CH"/>
+                <a:rPr lang="de-CH" dirty="0"/>
                 <a:t> </a:t>
               </a:r>
               <a:r>
-                <a:rPr lang="de-CH" err="1"/>
+                <a:rPr lang="de-CH" dirty="0" err="1"/>
                 <a:t>carType</a:t>
               </a:r>
               <a:r>
-                <a:rPr lang="de-CH"/>
+                <a:rPr lang="de-CH" dirty="0"/>
                 <a:t>: </a:t>
               </a:r>
               <a:r>
-                <a:rPr lang="de-CH" err="1"/>
+                <a:rPr lang="de-CH" dirty="0" err="1"/>
                 <a:t>int</a:t>
               </a:r>
-              <a:endParaRPr lang="de-CH"/>
-            </a:p>
-            <a:p>
-              <a:pPr>
-                <a:buFontTx/>
-                <a:buChar char="-"/>
-              </a:pPr>
-              <a:r>
-                <a:rPr lang="de-CH"/>
-                <a:t> </a:t>
-              </a:r>
-              <a:r>
-                <a:rPr lang="de-CH" err="1"/>
-                <a:t>picture</a:t>
-              </a:r>
-              <a:r>
-                <a:rPr lang="de-CH"/>
-                <a:t>: String</a:t>
-              </a:r>
-            </a:p>
-            <a:p>
-              <a:pPr>
-                <a:buFontTx/>
-                <a:buChar char="-"/>
-              </a:pPr>
-              <a:r>
-                <a:rPr lang="de-CH"/>
-                <a:t> </a:t>
-              </a:r>
-              <a:r>
-                <a:rPr lang="de-CH" err="1"/>
-                <a:t>positions</a:t>
-              </a:r>
-              <a:r>
-                <a:rPr lang="de-CH"/>
-                <a:t>: </a:t>
-              </a:r>
-              <a:r>
-                <a:rPr lang="de-CH" err="1"/>
-                <a:t>int</a:t>
-              </a:r>
-              <a:r>
-                <a:rPr lang="de-CH"/>
-                <a:t>[2][3]</a:t>
-              </a:r>
+              <a:endParaRPr lang="de-CH" dirty="0"/>
             </a:p>
           </p:txBody>
         </p:sp>
@@ -8727,8 +8636,8 @@
           </p:nvSpPr>
           <p:spPr>
             <a:xfrm>
-              <a:off x="2001806" y="3296411"/>
-              <a:ext cx="4572032" cy="667187"/>
+              <a:off x="2001806" y="2772027"/>
+              <a:ext cx="4572032" cy="667188"/>
             </a:xfrm>
             <a:prstGeom prst="rect">
               <a:avLst/>
@@ -8784,7 +8693,29 @@
               </a:r>
               <a:r>
                 <a:rPr lang="de-CH" i="1" dirty="0" err="1"/>
-                <a:t>startposX</a:t>
+                <a:t>position</a:t>
+              </a:r>
+              <a:r>
+                <a:rPr lang="de-CH" i="1" dirty="0"/>
+                <a:t> : Point)</a:t>
+              </a:r>
+            </a:p>
+            <a:p>
+              <a:r>
+                <a:rPr lang="de-CH" i="1" dirty="0"/>
+                <a:t>+ </a:t>
+              </a:r>
+              <a:r>
+                <a:rPr lang="de-CH" dirty="0" err="1"/>
+                <a:t>changeCarSettings</a:t>
+              </a:r>
+              <a:r>
+                <a:rPr lang="de-CH" dirty="0"/>
+                <a:t>(</a:t>
+              </a:r>
+              <a:r>
+                <a:rPr lang="de-CH" i="1" dirty="0" err="1"/>
+                <a:t>maxSpeed</a:t>
               </a:r>
               <a:r>
                 <a:rPr lang="de-CH" i="1" dirty="0"/>
@@ -8800,7 +8731,7 @@
               </a:r>
               <a:r>
                 <a:rPr lang="de-CH" i="1" dirty="0" err="1"/>
-                <a:t>startposY</a:t>
+                <a:t>carType</a:t>
               </a:r>
               <a:r>
                 <a:rPr lang="de-CH" i="1" dirty="0"/>
@@ -8816,141 +8747,11 @@
               </a:r>
               <a:r>
                 <a:rPr lang="de-CH" i="1" dirty="0" err="1"/>
-                <a:t>endposX</a:t>
+                <a:t>position</a:t>
               </a:r>
               <a:r>
                 <a:rPr lang="de-CH" i="1" dirty="0"/>
-                <a:t> : </a:t>
-              </a:r>
-              <a:r>
-                <a:rPr lang="de-CH" i="1" dirty="0" err="1"/>
-                <a:t>int</a:t>
-              </a:r>
-              <a:r>
-                <a:rPr lang="de-CH" i="1" dirty="0"/>
-                <a:t>, </a:t>
-              </a:r>
-              <a:r>
-                <a:rPr lang="de-CH" i="1" dirty="0" err="1"/>
-                <a:t>endposY</a:t>
-              </a:r>
-              <a:r>
-                <a:rPr lang="de-CH" i="1" dirty="0"/>
-                <a:t> : </a:t>
-              </a:r>
-              <a:r>
-                <a:rPr lang="de-CH" i="1" dirty="0" err="1"/>
-                <a:t>int</a:t>
-              </a:r>
-              <a:r>
-                <a:rPr lang="de-CH" i="1" dirty="0"/>
-                <a:t>)</a:t>
-              </a:r>
-            </a:p>
-            <a:p>
-              <a:r>
-                <a:rPr lang="de-CH" i="1" dirty="0"/>
-                <a:t>+ </a:t>
-              </a:r>
-              <a:r>
-                <a:rPr lang="de-CH" dirty="0" err="1"/>
-                <a:t>changeCarSettings</a:t>
-              </a:r>
-              <a:r>
-                <a:rPr lang="de-CH" dirty="0"/>
-                <a:t>(</a:t>
-              </a:r>
-              <a:r>
-                <a:rPr lang="de-CH" i="1" dirty="0" err="1"/>
-                <a:t>maxSpeed</a:t>
-              </a:r>
-              <a:r>
-                <a:rPr lang="de-CH" i="1" dirty="0"/>
-                <a:t> : </a:t>
-              </a:r>
-              <a:r>
-                <a:rPr lang="de-CH" i="1" dirty="0" err="1"/>
-                <a:t>int</a:t>
-              </a:r>
-              <a:r>
-                <a:rPr lang="de-CH" i="1" dirty="0"/>
-                <a:t>, </a:t>
-              </a:r>
-              <a:r>
-                <a:rPr lang="de-CH" i="1" dirty="0" err="1"/>
-                <a:t>carType</a:t>
-              </a:r>
-              <a:r>
-                <a:rPr lang="de-CH" i="1" dirty="0"/>
-                <a:t> : </a:t>
-              </a:r>
-              <a:r>
-                <a:rPr lang="de-CH" i="1" dirty="0" err="1"/>
-                <a:t>int</a:t>
-              </a:r>
-              <a:r>
-                <a:rPr lang="de-CH" i="1" dirty="0"/>
-                <a:t>, </a:t>
-              </a:r>
-              <a:r>
-                <a:rPr lang="de-CH" i="1" dirty="0" err="1"/>
-                <a:t>startposX</a:t>
-              </a:r>
-              <a:r>
-                <a:rPr lang="de-CH" i="1" dirty="0"/>
-                <a:t> : </a:t>
-              </a:r>
-              <a:r>
-                <a:rPr lang="de-CH" i="1" dirty="0" err="1"/>
-                <a:t>int</a:t>
-              </a:r>
-              <a:r>
-                <a:rPr lang="de-CH" i="1" dirty="0"/>
-                <a:t>, </a:t>
-              </a:r>
-              <a:r>
-                <a:rPr lang="de-CH" i="1" dirty="0" err="1"/>
-                <a:t>startposY</a:t>
-              </a:r>
-              <a:r>
-                <a:rPr lang="de-CH" i="1" dirty="0"/>
-                <a:t> : </a:t>
-              </a:r>
-              <a:r>
-                <a:rPr lang="de-CH" i="1" dirty="0" err="1"/>
-                <a:t>int</a:t>
-              </a:r>
-              <a:r>
-                <a:rPr lang="de-CH" i="1" dirty="0"/>
-                <a:t>, </a:t>
-              </a:r>
-              <a:r>
-                <a:rPr lang="de-CH" i="1" dirty="0" err="1"/>
-                <a:t>endposX</a:t>
-              </a:r>
-              <a:r>
-                <a:rPr lang="de-CH" i="1" dirty="0"/>
-                <a:t> : </a:t>
-              </a:r>
-              <a:r>
-                <a:rPr lang="de-CH" i="1" dirty="0" err="1"/>
-                <a:t>int</a:t>
-              </a:r>
-              <a:r>
-                <a:rPr lang="de-CH" i="1" dirty="0"/>
-                <a:t>, </a:t>
-              </a:r>
-              <a:r>
-                <a:rPr lang="de-CH" i="1" dirty="0" err="1"/>
-                <a:t>endposY</a:t>
-              </a:r>
-              <a:r>
-                <a:rPr lang="de-CH" i="1" dirty="0"/>
-                <a:t> : </a:t>
-              </a:r>
-              <a:r>
-                <a:rPr lang="de-CH" i="1" dirty="0" err="1"/>
-                <a:t>int</a:t>
+                <a:t> : Point</a:t>
               </a:r>
               <a:r>
                 <a:rPr lang="de-CH" dirty="0"/>
@@ -8970,15 +8771,14 @@
             </a:extLst>
           </p:cNvPr>
           <p:cNvCxnSpPr>
-            <a:stCxn id="52" idx="0"/>
-            <a:endCxn id="70" idx="2"/>
+            <a:cxnSpLocks/>
           </p:cNvCxnSpPr>
           <p:nvPr/>
         </p:nvCxnSpPr>
         <p:spPr>
           <a:xfrm flipH="1" flipV="1">
-            <a:off x="-6863073" y="7258914"/>
-            <a:ext cx="33246" cy="2102408"/>
+            <a:off x="-17065686" y="-455534"/>
+            <a:ext cx="4430403" cy="10068070"/>
           </a:xfrm>
           <a:prstGeom prst="straightConnector1">
             <a:avLst/>
@@ -9016,7 +8816,7 @@
         </p:nvGrpSpPr>
         <p:grpSpPr>
           <a:xfrm rot="5400000">
-            <a:off x="-1031296" y="6401619"/>
+            <a:off x="-1028716" y="6081650"/>
             <a:ext cx="352400" cy="452140"/>
             <a:chOff x="10542488" y="4562229"/>
             <a:chExt cx="352400" cy="452140"/>
@@ -9139,8 +8939,8 @@
         </p:nvCxnSpPr>
         <p:spPr>
           <a:xfrm flipH="1" flipV="1">
-            <a:off x="-629027" y="6627690"/>
-            <a:ext cx="4493010" cy="1553685"/>
+            <a:off x="-626447" y="6307721"/>
+            <a:ext cx="4490430" cy="1873654"/>
           </a:xfrm>
           <a:prstGeom prst="line">
             <a:avLst/>
@@ -9161,42 +8961,6 @@
           </a:fontRef>
         </p:style>
       </p:cxnSp>
-      <p:pic>
-        <p:nvPicPr>
-          <p:cNvPr id="75" name="Grafik 74">
-            <a:extLst>
-              <a:ext uri="{FF2B5EF4-FFF2-40B4-BE49-F238E27FC236}">
-                <a16:creationId xmlns:a16="http://schemas.microsoft.com/office/drawing/2014/main" id="{B62D909F-5A35-4C5E-B55D-62A6145BDDB2}"/>
-              </a:ext>
-            </a:extLst>
-          </p:cNvPr>
-          <p:cNvPicPr>
-            <a:picLocks noChangeAspect="1"/>
-          </p:cNvPicPr>
-          <p:nvPr/>
-        </p:nvPicPr>
-        <p:blipFill>
-          <a:blip r:embed="rId2">
-            <a:extLst>
-              <a:ext uri="{28A0092B-C50C-407E-A947-70E740481C1C}">
-                <a14:useLocalDpi xmlns:a14="http://schemas.microsoft.com/office/drawing/2010/main" val="0"/>
-              </a:ext>
-            </a:extLst>
-          </a:blip>
-          <a:stretch>
-            <a:fillRect/>
-          </a:stretch>
-        </p:blipFill>
-        <p:spPr>
-          <a:xfrm>
-            <a:off x="-30931263" y="-7150228"/>
-            <a:ext cx="12511521" cy="3141991"/>
-          </a:xfrm>
-          <a:prstGeom prst="rect">
-            <a:avLst/>
-          </a:prstGeom>
-        </p:spPr>
-      </p:pic>
       <p:cxnSp>
         <p:nvCxnSpPr>
           <p:cNvPr id="76" name="Gerade Verbindung mit Pfeil 75">
@@ -9208,15 +8972,14 @@
           </p:cNvPr>
           <p:cNvCxnSpPr>
             <a:cxnSpLocks/>
-            <a:stCxn id="68" idx="0"/>
             <a:endCxn id="58" idx="2"/>
           </p:cNvCxnSpPr>
           <p:nvPr/>
         </p:nvCxnSpPr>
         <p:spPr>
           <a:xfrm flipH="1" flipV="1">
-            <a:off x="-6918396" y="3215246"/>
-            <a:ext cx="55323" cy="1874819"/>
+            <a:off x="-15243246" y="-455534"/>
+            <a:ext cx="2607962" cy="5690664"/>
           </a:xfrm>
           <a:prstGeom prst="straightConnector1">
             <a:avLst/>
@@ -9269,7 +9032,7 @@
           <a:lstStyle/>
           <a:p>
             <a:r>
-              <a:rPr lang="de-CH" sz="2000" b="1" dirty="0"/>
+              <a:rPr lang="de-CH" sz="2000" b="1"/>
               <a:t>0</a:t>
             </a:r>
           </a:p>
@@ -9304,7 +9067,7 @@
           <a:lstStyle/>
           <a:p>
             <a:r>
-              <a:rPr lang="de-CH" sz="2000" b="1" dirty="0"/>
+              <a:rPr lang="de-CH" sz="2000" b="1"/>
               <a:t>*</a:t>
             </a:r>
           </a:p>
@@ -9339,7 +9102,7 @@
           <a:lstStyle/>
           <a:p>
             <a:r>
-              <a:rPr lang="de-CH" sz="2000" b="1" dirty="0"/>
+              <a:rPr lang="de-CH" sz="2000" b="1"/>
               <a:t>0</a:t>
             </a:r>
           </a:p>
@@ -9374,7 +9137,7 @@
           <a:lstStyle/>
           <a:p>
             <a:r>
-              <a:rPr lang="de-CH" sz="2000" b="1" dirty="0"/>
+              <a:rPr lang="de-CH" sz="2000" b="1"/>
               <a:t>1</a:t>
             </a:r>
           </a:p>
@@ -9409,7 +9172,7 @@
           <a:lstStyle/>
           <a:p>
             <a:r>
-              <a:rPr lang="de-CH" sz="2000" b="1" dirty="0"/>
+              <a:rPr lang="de-CH" sz="2000" b="1"/>
               <a:t>0</a:t>
             </a:r>
           </a:p>
@@ -9444,7 +9207,7 @@
           <a:lstStyle/>
           <a:p>
             <a:r>
-              <a:rPr lang="de-CH" sz="2000" b="1" dirty="0"/>
+              <a:rPr lang="de-CH" sz="2000" b="1"/>
               <a:t>*</a:t>
             </a:r>
           </a:p>
@@ -9464,7 +9227,7 @@
         </p:nvSpPr>
         <p:spPr>
           <a:xfrm>
-            <a:off x="-1024626" y="6047665"/>
+            <a:off x="-1032747" y="5547899"/>
             <a:ext cx="284052" cy="400110"/>
           </a:xfrm>
           <a:prstGeom prst="rect">
@@ -9479,7 +9242,7 @@
           <a:lstStyle/>
           <a:p>
             <a:r>
-              <a:rPr lang="de-CH" sz="2000" b="1" dirty="0"/>
+              <a:rPr lang="de-CH" sz="2000" b="1"/>
               <a:t>*</a:t>
             </a:r>
           </a:p>
@@ -9514,7 +9277,7 @@
           <a:lstStyle/>
           <a:p>
             <a:r>
-              <a:rPr lang="de-CH" sz="2000" b="1" dirty="0"/>
+              <a:rPr lang="de-CH" sz="2000" b="1"/>
               <a:t>*</a:t>
             </a:r>
           </a:p>
@@ -9573,6 +9336,238 @@
           </a:p>
         </p:txBody>
       </p:sp>
+      <p:grpSp>
+        <p:nvGrpSpPr>
+          <p:cNvPr id="79" name="Gruppieren 78">
+            <a:extLst>
+              <a:ext uri="{FF2B5EF4-FFF2-40B4-BE49-F238E27FC236}">
+                <a16:creationId xmlns:a16="http://schemas.microsoft.com/office/drawing/2014/main" id="{C69E60F5-5D85-4B71-9BD6-36DA159B3443}"/>
+              </a:ext>
+            </a:extLst>
+          </p:cNvPr>
+          <p:cNvGrpSpPr/>
+          <p:nvPr/>
+        </p:nvGrpSpPr>
+        <p:grpSpPr>
+          <a:xfrm>
+            <a:off x="-11295531" y="1149668"/>
+            <a:ext cx="9059069" cy="1388211"/>
+            <a:chOff x="2001806" y="1724764"/>
+            <a:chExt cx="4572032" cy="1388211"/>
+          </a:xfrm>
+        </p:grpSpPr>
+        <p:sp>
+          <p:nvSpPr>
+            <p:cNvPr id="81" name="Textfeld 80">
+              <a:extLst>
+                <a:ext uri="{FF2B5EF4-FFF2-40B4-BE49-F238E27FC236}">
+                  <a16:creationId xmlns:a16="http://schemas.microsoft.com/office/drawing/2014/main" id="{896CF743-A61D-416A-B407-091D39EFA64E}"/>
+                </a:ext>
+              </a:extLst>
+            </p:cNvPr>
+            <p:cNvSpPr txBox="1"/>
+            <p:nvPr/>
+          </p:nvSpPr>
+          <p:spPr>
+            <a:xfrm>
+              <a:off x="2001806" y="1724764"/>
+              <a:ext cx="4572032" cy="369332"/>
+            </a:xfrm>
+            <a:prstGeom prst="rect">
+              <a:avLst/>
+            </a:prstGeom>
+            <a:noFill/>
+            <a:ln>
+              <a:solidFill>
+                <a:schemeClr val="tx1"/>
+              </a:solidFill>
+            </a:ln>
+          </p:spPr>
+          <p:txBody>
+            <a:bodyPr wrap="square" rtlCol="0">
+              <a:spAutoFit/>
+            </a:bodyPr>
+            <a:lstStyle/>
+            <a:p>
+              <a:pPr algn="ctr"/>
+              <a:r>
+                <a:rPr lang="de-CH" dirty="0" err="1"/>
+                <a:t>class</a:t>
+              </a:r>
+              <a:r>
+                <a:rPr lang="de-CH" dirty="0"/>
+                <a:t> </a:t>
+              </a:r>
+              <a:r>
+                <a:rPr lang="de-CH" dirty="0" err="1"/>
+                <a:t>Pedestrain</a:t>
+              </a:r>
+              <a:endParaRPr lang="de-CH" dirty="0"/>
+            </a:p>
+          </p:txBody>
+        </p:sp>
+        <p:sp>
+          <p:nvSpPr>
+            <p:cNvPr id="86" name="Textfeld 85">
+              <a:extLst>
+                <a:ext uri="{FF2B5EF4-FFF2-40B4-BE49-F238E27FC236}">
+                  <a16:creationId xmlns:a16="http://schemas.microsoft.com/office/drawing/2014/main" id="{0F314504-AC53-47EF-938B-BA9B4419240C}"/>
+                </a:ext>
+              </a:extLst>
+            </p:cNvPr>
+            <p:cNvSpPr txBox="1"/>
+            <p:nvPr/>
+          </p:nvSpPr>
+          <p:spPr>
+            <a:xfrm>
+              <a:off x="2001806" y="2096082"/>
+              <a:ext cx="4572032" cy="369332"/>
+            </a:xfrm>
+            <a:prstGeom prst="rect">
+              <a:avLst/>
+            </a:prstGeom>
+            <a:noFill/>
+            <a:ln>
+              <a:solidFill>
+                <a:schemeClr val="tx1"/>
+              </a:solidFill>
+            </a:ln>
+          </p:spPr>
+          <p:txBody>
+            <a:bodyPr wrap="square" rtlCol="0">
+              <a:spAutoFit/>
+            </a:bodyPr>
+            <a:lstStyle/>
+            <a:p>
+              <a:endParaRPr lang="de-CH" dirty="0"/>
+            </a:p>
+          </p:txBody>
+        </p:sp>
+        <p:sp>
+          <p:nvSpPr>
+            <p:cNvPr id="87" name="Textfeld 86">
+              <a:extLst>
+                <a:ext uri="{FF2B5EF4-FFF2-40B4-BE49-F238E27FC236}">
+                  <a16:creationId xmlns:a16="http://schemas.microsoft.com/office/drawing/2014/main" id="{B34607EA-B866-43EF-86BE-C88858BF89FF}"/>
+                </a:ext>
+              </a:extLst>
+            </p:cNvPr>
+            <p:cNvSpPr txBox="1"/>
+            <p:nvPr/>
+          </p:nvSpPr>
+          <p:spPr>
+            <a:xfrm>
+              <a:off x="2001806" y="2466644"/>
+              <a:ext cx="4572032" cy="646331"/>
+            </a:xfrm>
+            <a:prstGeom prst="rect">
+              <a:avLst/>
+            </a:prstGeom>
+            <a:noFill/>
+            <a:ln>
+              <a:solidFill>
+                <a:schemeClr val="tx1"/>
+              </a:solidFill>
+            </a:ln>
+          </p:spPr>
+          <p:txBody>
+            <a:bodyPr wrap="square" rtlCol="0">
+              <a:spAutoFit/>
+            </a:bodyPr>
+            <a:lstStyle/>
+            <a:p>
+              <a:r>
+                <a:rPr lang="de-CH" i="1" dirty="0"/>
+                <a:t>+ </a:t>
+              </a:r>
+              <a:r>
+                <a:rPr lang="de-CH" i="1" dirty="0" err="1"/>
+                <a:t>Pedstrain</a:t>
+              </a:r>
+              <a:r>
+                <a:rPr lang="de-CH" i="1" dirty="0"/>
+                <a:t>(</a:t>
+              </a:r>
+              <a:r>
+                <a:rPr lang="de-CH" i="1" dirty="0" err="1"/>
+                <a:t>position</a:t>
+              </a:r>
+              <a:r>
+                <a:rPr lang="de-CH" i="1" dirty="0"/>
+                <a:t> : Point)</a:t>
+              </a:r>
+            </a:p>
+            <a:p>
+              <a:r>
+                <a:rPr lang="de-CH" i="1" dirty="0"/>
+                <a:t>+ </a:t>
+              </a:r>
+              <a:r>
+                <a:rPr lang="de-CH" dirty="0" err="1"/>
+                <a:t>changePedstrainSettings</a:t>
+              </a:r>
+              <a:r>
+                <a:rPr lang="de-CH" dirty="0"/>
+                <a:t>(</a:t>
+              </a:r>
+              <a:r>
+                <a:rPr lang="de-CH" i="1" dirty="0" err="1"/>
+                <a:t>position</a:t>
+              </a:r>
+              <a:r>
+                <a:rPr lang="de-CH" i="1" dirty="0"/>
+                <a:t> : Point</a:t>
+              </a:r>
+              <a:r>
+                <a:rPr lang="de-CH" dirty="0"/>
+                <a:t>)</a:t>
+              </a:r>
+            </a:p>
+          </p:txBody>
+        </p:sp>
+      </p:grpSp>
+      <p:cxnSp>
+        <p:nvCxnSpPr>
+          <p:cNvPr id="92" name="Gerade Verbindung mit Pfeil 91">
+            <a:extLst>
+              <a:ext uri="{FF2B5EF4-FFF2-40B4-BE49-F238E27FC236}">
+                <a16:creationId xmlns:a16="http://schemas.microsoft.com/office/drawing/2014/main" id="{DE4873E0-67DE-4C96-BA6D-FC6466DD0816}"/>
+              </a:ext>
+            </a:extLst>
+          </p:cNvPr>
+          <p:cNvCxnSpPr>
+            <a:cxnSpLocks/>
+            <a:stCxn id="81" idx="1"/>
+          </p:cNvCxnSpPr>
+          <p:nvPr/>
+        </p:nvCxnSpPr>
+        <p:spPr>
+          <a:xfrm flipH="1" flipV="1">
+            <a:off x="-12635284" y="-447005"/>
+            <a:ext cx="1339753" cy="1781339"/>
+          </a:xfrm>
+          <a:prstGeom prst="straightConnector1">
+            <a:avLst/>
+          </a:prstGeom>
+          <a:ln w="57150">
+            <a:tailEnd type="triangle"/>
+          </a:ln>
+        </p:spPr>
+        <p:style>
+          <a:lnRef idx="1">
+            <a:schemeClr val="accent1"/>
+          </a:lnRef>
+          <a:fillRef idx="0">
+            <a:schemeClr val="accent1"/>
+          </a:fillRef>
+          <a:effectRef idx="0">
+            <a:schemeClr val="accent1"/>
+          </a:effectRef>
+          <a:fontRef idx="minor">
+            <a:schemeClr val="tx1"/>
+          </a:fontRef>
+        </p:style>
+      </p:cxnSp>
     </p:spTree>
     <p:extLst>
       <p:ext uri="{BB962C8B-B14F-4D97-AF65-F5344CB8AC3E}">
@@ -9587,803 +9582,6 @@
 </file>
 
 <file path=ppt/slides/slide7.xml><?xml version="1.0" encoding="utf-8"?>
-<p:sld xmlns:a="http://schemas.openxmlformats.org/drawingml/2006/main" xmlns:r="http://schemas.openxmlformats.org/officeDocument/2006/relationships" xmlns:p="http://schemas.openxmlformats.org/presentationml/2006/main">
-  <p:cSld>
-    <p:spTree>
-      <p:nvGrpSpPr>
-        <p:cNvPr id="1" name=""/>
-        <p:cNvGrpSpPr/>
-        <p:nvPr/>
-      </p:nvGrpSpPr>
-      <p:grpSpPr>
-        <a:xfrm>
-          <a:off x="0" y="0"/>
-          <a:ext cx="0" cy="0"/>
-          <a:chOff x="0" y="0"/>
-          <a:chExt cx="0" cy="0"/>
-        </a:xfrm>
-      </p:grpSpPr>
-      <p:sp>
-        <p:nvSpPr>
-          <p:cNvPr id="2" name="Titel 1">
-            <a:extLst>
-              <a:ext uri="{FF2B5EF4-FFF2-40B4-BE49-F238E27FC236}">
-                <a16:creationId xmlns:a16="http://schemas.microsoft.com/office/drawing/2014/main" id="{1C024452-1C89-4059-A820-993C3D29EF4A}"/>
-              </a:ext>
-            </a:extLst>
-          </p:cNvPr>
-          <p:cNvSpPr>
-            <a:spLocks noGrp="1"/>
-          </p:cNvSpPr>
-          <p:nvPr>
-            <p:ph type="title"/>
-          </p:nvPr>
-        </p:nvSpPr>
-        <p:spPr/>
-        <p:txBody>
-          <a:bodyPr/>
-          <a:lstStyle/>
-          <a:p>
-            <a:r>
-              <a:rPr lang="de-CH" dirty="0"/>
-              <a:t>Programmablauf (Initialisierung)</a:t>
-            </a:r>
-            <a:br>
-              <a:rPr lang="de-CH" dirty="0"/>
-            </a:br>
-            <a:r>
-              <a:rPr lang="de-CH" sz="2800" dirty="0"/>
-              <a:t>Dient zur Verständigung</a:t>
-            </a:r>
-            <a:endParaRPr lang="de-CH" dirty="0"/>
-          </a:p>
-        </p:txBody>
-      </p:sp>
-      <p:sp>
-        <p:nvSpPr>
-          <p:cNvPr id="3" name="Textplatzhalter 2">
-            <a:extLst>
-              <a:ext uri="{FF2B5EF4-FFF2-40B4-BE49-F238E27FC236}">
-                <a16:creationId xmlns:a16="http://schemas.microsoft.com/office/drawing/2014/main" id="{96303AB0-3E83-44F3-BE6A-6A3795EC075A}"/>
-              </a:ext>
-            </a:extLst>
-          </p:cNvPr>
-          <p:cNvSpPr>
-            <a:spLocks noGrp="1"/>
-          </p:cNvSpPr>
-          <p:nvPr>
-            <p:ph type="body"/>
-          </p:nvPr>
-        </p:nvSpPr>
-        <p:spPr>
-          <a:xfrm>
-            <a:off x="649800" y="2017080"/>
-            <a:ext cx="11703600" cy="5938035"/>
-          </a:xfrm>
-        </p:spPr>
-        <p:txBody>
-          <a:bodyPr>
-            <a:normAutofit fontScale="70000" lnSpcReduction="20000"/>
-          </a:bodyPr>
-          <a:lstStyle/>
-          <a:p>
-            <a:pPr marL="0" indent="0">
-              <a:buNone/>
-            </a:pPr>
-            <a:r>
-              <a:rPr lang="de-CH" dirty="0"/>
-              <a:t>Main()</a:t>
-            </a:r>
-          </a:p>
-          <a:p>
-            <a:pPr marL="0" indent="0">
-              <a:buNone/>
-            </a:pPr>
-            <a:r>
-              <a:rPr lang="de-CH" i="1" dirty="0">
-                <a:solidFill>
-                  <a:srgbClr val="FF0000"/>
-                </a:solidFill>
-              </a:rPr>
-              <a:t>+ Algorithmus()</a:t>
-            </a:r>
-          </a:p>
-          <a:p>
-            <a:pPr marL="0" indent="0">
-              <a:buNone/>
-            </a:pPr>
-            <a:r>
-              <a:rPr lang="de-CH" i="1" dirty="0" err="1">
-                <a:solidFill>
-                  <a:srgbClr val="7030A0"/>
-                </a:solidFill>
-              </a:rPr>
-              <a:t>GuiCrossroad</a:t>
-            </a:r>
-            <a:r>
-              <a:rPr lang="de-CH" i="1" dirty="0">
-                <a:solidFill>
-                  <a:srgbClr val="7030A0"/>
-                </a:solidFill>
-              </a:rPr>
-              <a:t>(</a:t>
-            </a:r>
-            <a:r>
-              <a:rPr lang="de-CH" i="1" dirty="0" err="1">
-                <a:solidFill>
-                  <a:srgbClr val="7030A0"/>
-                </a:solidFill>
-              </a:rPr>
-              <a:t>countOfRoutes</a:t>
-            </a:r>
-            <a:r>
-              <a:rPr lang="de-CH" i="1" dirty="0">
-                <a:solidFill>
-                  <a:srgbClr val="7030A0"/>
-                </a:solidFill>
-              </a:rPr>
-              <a:t> : </a:t>
-            </a:r>
-            <a:r>
-              <a:rPr lang="de-CH" i="1" dirty="0" err="1">
-                <a:solidFill>
-                  <a:srgbClr val="7030A0"/>
-                </a:solidFill>
-              </a:rPr>
-              <a:t>int</a:t>
-            </a:r>
-            <a:r>
-              <a:rPr lang="de-CH" i="1" dirty="0">
-                <a:solidFill>
-                  <a:srgbClr val="7030A0"/>
-                </a:solidFill>
-              </a:rPr>
-              <a:t>)</a:t>
-            </a:r>
-          </a:p>
-          <a:p>
-            <a:pPr marL="0" indent="0">
-              <a:buNone/>
-            </a:pPr>
-            <a:r>
-              <a:rPr lang="de-CH" dirty="0">
-                <a:solidFill>
-                  <a:srgbClr val="7030A0"/>
-                </a:solidFill>
-              </a:rPr>
-              <a:t>+ </a:t>
-            </a:r>
-            <a:r>
-              <a:rPr lang="de-CH" dirty="0" err="1">
-                <a:solidFill>
-                  <a:srgbClr val="7030A0"/>
-                </a:solidFill>
-              </a:rPr>
-              <a:t>selectCrossroad</a:t>
-            </a:r>
-            <a:r>
-              <a:rPr lang="de-CH" dirty="0">
-                <a:solidFill>
-                  <a:srgbClr val="7030A0"/>
-                </a:solidFill>
-              </a:rPr>
-              <a:t>() : </a:t>
-            </a:r>
-            <a:r>
-              <a:rPr lang="de-CH" dirty="0" err="1">
-                <a:solidFill>
-                  <a:srgbClr val="7030A0"/>
-                </a:solidFill>
-              </a:rPr>
-              <a:t>int</a:t>
-            </a:r>
-            <a:endParaRPr lang="de-CH" dirty="0">
-              <a:solidFill>
-                <a:srgbClr val="7030A0"/>
-              </a:solidFill>
-            </a:endParaRPr>
-          </a:p>
-          <a:p>
-            <a:pPr marL="0" indent="0">
-              <a:buNone/>
-            </a:pPr>
-            <a:r>
-              <a:rPr lang="de-CH" dirty="0">
-                <a:solidFill>
-                  <a:srgbClr val="FF0000"/>
-                </a:solidFill>
-              </a:rPr>
-              <a:t>+ </a:t>
-            </a:r>
-            <a:r>
-              <a:rPr lang="de-CH" dirty="0" err="1">
-                <a:solidFill>
-                  <a:srgbClr val="FF0000"/>
-                </a:solidFill>
-              </a:rPr>
-              <a:t>setCrossroadSetting</a:t>
-            </a:r>
-            <a:r>
-              <a:rPr lang="de-CH" dirty="0">
-                <a:solidFill>
-                  <a:srgbClr val="FF0000"/>
-                </a:solidFill>
-              </a:rPr>
-              <a:t>()</a:t>
-            </a:r>
-          </a:p>
-          <a:p>
-            <a:pPr marL="0" indent="0">
-              <a:buNone/>
-            </a:pPr>
-            <a:r>
-              <a:rPr lang="de-CH" dirty="0">
-                <a:solidFill>
-                  <a:srgbClr val="FF0000"/>
-                </a:solidFill>
-              </a:rPr>
-              <a:t>+ </a:t>
-            </a:r>
-            <a:r>
-              <a:rPr lang="de-CH" dirty="0" err="1">
-                <a:solidFill>
-                  <a:srgbClr val="FF0000"/>
-                </a:solidFill>
-              </a:rPr>
-              <a:t>createNewCar</a:t>
-            </a:r>
-            <a:r>
-              <a:rPr lang="de-CH" dirty="0">
-                <a:solidFill>
-                  <a:srgbClr val="FF0000"/>
-                </a:solidFill>
-              </a:rPr>
-              <a:t>()</a:t>
-            </a:r>
-          </a:p>
-          <a:p>
-            <a:pPr marL="0" indent="0">
-              <a:buNone/>
-            </a:pPr>
-            <a:r>
-              <a:rPr lang="de-CH" dirty="0">
-                <a:solidFill>
-                  <a:srgbClr val="FF0000"/>
-                </a:solidFill>
-              </a:rPr>
-              <a:t>+ </a:t>
-            </a:r>
-            <a:r>
-              <a:rPr lang="de-CH" dirty="0" err="1">
-                <a:solidFill>
-                  <a:srgbClr val="FF0000"/>
-                </a:solidFill>
-              </a:rPr>
-              <a:t>createNewPedstrain</a:t>
-            </a:r>
-            <a:r>
-              <a:rPr lang="de-CH" dirty="0">
-                <a:solidFill>
-                  <a:srgbClr val="FF0000"/>
-                </a:solidFill>
-              </a:rPr>
-              <a:t>()</a:t>
-            </a:r>
-          </a:p>
-          <a:p>
-            <a:pPr marL="0" indent="0">
-              <a:buNone/>
-            </a:pPr>
-            <a:r>
-              <a:rPr lang="de-CH" dirty="0">
-                <a:solidFill>
-                  <a:srgbClr val="FF0000"/>
-                </a:solidFill>
-              </a:rPr>
-              <a:t>+ </a:t>
-            </a:r>
-            <a:r>
-              <a:rPr lang="de-CH" dirty="0" err="1">
-                <a:solidFill>
-                  <a:srgbClr val="FF0000"/>
-                </a:solidFill>
-              </a:rPr>
-              <a:t>createNewPublicTraffic</a:t>
-            </a:r>
-            <a:r>
-              <a:rPr lang="de-CH" dirty="0">
-                <a:solidFill>
-                  <a:srgbClr val="FF0000"/>
-                </a:solidFill>
-              </a:rPr>
-              <a:t>()</a:t>
-            </a:r>
-          </a:p>
-          <a:p>
-            <a:pPr marL="0" indent="0">
-              <a:buNone/>
-            </a:pPr>
-            <a:r>
-              <a:rPr lang="de-CH" dirty="0">
-                <a:solidFill>
-                  <a:srgbClr val="FF0000"/>
-                </a:solidFill>
-              </a:rPr>
-              <a:t>+ </a:t>
-            </a:r>
-            <a:r>
-              <a:rPr lang="de-CH" dirty="0" err="1">
-                <a:solidFill>
-                  <a:srgbClr val="FF0000"/>
-                </a:solidFill>
-              </a:rPr>
-              <a:t>startSimulate</a:t>
-            </a:r>
-            <a:r>
-              <a:rPr lang="de-CH" dirty="0">
-                <a:solidFill>
-                  <a:srgbClr val="FF0000"/>
-                </a:solidFill>
-              </a:rPr>
-              <a:t>()</a:t>
-            </a:r>
-          </a:p>
-          <a:p>
-            <a:pPr marL="0" indent="0">
-              <a:buNone/>
-            </a:pPr>
-            <a:r>
-              <a:rPr lang="de-CH" dirty="0">
-                <a:solidFill>
-                  <a:srgbClr val="7030A0"/>
-                </a:solidFill>
-              </a:rPr>
-              <a:t>+ </a:t>
-            </a:r>
-            <a:r>
-              <a:rPr lang="de-CH" dirty="0" err="1">
-                <a:solidFill>
-                  <a:srgbClr val="7030A0"/>
-                </a:solidFill>
-              </a:rPr>
-              <a:t>drawCrossroad</a:t>
-            </a:r>
-            <a:r>
-              <a:rPr lang="de-CH" dirty="0">
-                <a:solidFill>
-                  <a:srgbClr val="7030A0"/>
-                </a:solidFill>
-              </a:rPr>
-              <a:t>()</a:t>
-            </a:r>
-          </a:p>
-          <a:p>
-            <a:pPr marL="0" indent="0">
-              <a:buNone/>
-            </a:pPr>
-            <a:r>
-              <a:rPr lang="de-CH" dirty="0">
-                <a:solidFill>
-                  <a:srgbClr val="7030A0"/>
-                </a:solidFill>
-              </a:rPr>
-              <a:t>+ </a:t>
-            </a:r>
-            <a:r>
-              <a:rPr lang="de-CH" dirty="0" err="1">
-                <a:solidFill>
-                  <a:srgbClr val="7030A0"/>
-                </a:solidFill>
-              </a:rPr>
-              <a:t>drawCarOrPublicTraffic</a:t>
-            </a:r>
-            <a:r>
-              <a:rPr lang="de-CH" dirty="0">
-                <a:solidFill>
-                  <a:srgbClr val="7030A0"/>
-                </a:solidFill>
-              </a:rPr>
-              <a:t>(</a:t>
-            </a:r>
-            <a:r>
-              <a:rPr lang="de-CH" dirty="0" err="1">
-                <a:solidFill>
-                  <a:srgbClr val="7030A0"/>
-                </a:solidFill>
-              </a:rPr>
-              <a:t>car</a:t>
-            </a:r>
-            <a:r>
-              <a:rPr lang="de-CH" dirty="0">
-                <a:solidFill>
-                  <a:srgbClr val="7030A0"/>
-                </a:solidFill>
-              </a:rPr>
-              <a:t> : </a:t>
-            </a:r>
-            <a:r>
-              <a:rPr lang="de-CH" dirty="0" err="1">
-                <a:solidFill>
-                  <a:srgbClr val="7030A0"/>
-                </a:solidFill>
-              </a:rPr>
-              <a:t>class</a:t>
-            </a:r>
-            <a:r>
-              <a:rPr lang="de-CH" dirty="0">
-                <a:solidFill>
-                  <a:srgbClr val="7030A0"/>
-                </a:solidFill>
-              </a:rPr>
-              <a:t>)</a:t>
-            </a:r>
-          </a:p>
-          <a:p>
-            <a:pPr marL="0" indent="0">
-              <a:buNone/>
-            </a:pPr>
-            <a:r>
-              <a:rPr lang="de-CH" dirty="0">
-                <a:solidFill>
-                  <a:srgbClr val="7030A0"/>
-                </a:solidFill>
-              </a:rPr>
-              <a:t>+ </a:t>
-            </a:r>
-            <a:r>
-              <a:rPr lang="de-CH" dirty="0" err="1">
-                <a:solidFill>
-                  <a:srgbClr val="7030A0"/>
-                </a:solidFill>
-              </a:rPr>
-              <a:t>drawPedstrain</a:t>
-            </a:r>
-            <a:r>
-              <a:rPr lang="de-CH" dirty="0">
-                <a:solidFill>
-                  <a:srgbClr val="7030A0"/>
-                </a:solidFill>
-              </a:rPr>
-              <a:t>(</a:t>
-            </a:r>
-            <a:r>
-              <a:rPr lang="de-CH" dirty="0" err="1">
-                <a:solidFill>
-                  <a:srgbClr val="7030A0"/>
-                </a:solidFill>
-              </a:rPr>
-              <a:t>pedstrain</a:t>
-            </a:r>
-            <a:r>
-              <a:rPr lang="de-CH" dirty="0">
-                <a:solidFill>
-                  <a:srgbClr val="7030A0"/>
-                </a:solidFill>
-              </a:rPr>
-              <a:t> : </a:t>
-            </a:r>
-            <a:r>
-              <a:rPr lang="de-CH" dirty="0" err="1">
-                <a:solidFill>
-                  <a:srgbClr val="7030A0"/>
-                </a:solidFill>
-              </a:rPr>
-              <a:t>class</a:t>
-            </a:r>
-            <a:r>
-              <a:rPr lang="de-CH" dirty="0">
-                <a:solidFill>
-                  <a:srgbClr val="7030A0"/>
-                </a:solidFill>
-              </a:rPr>
-              <a:t>)</a:t>
-            </a:r>
-          </a:p>
-          <a:p>
-            <a:pPr marL="0" indent="0">
-              <a:buNone/>
-            </a:pPr>
-            <a:r>
-              <a:rPr lang="de-CH" dirty="0">
-                <a:solidFill>
-                  <a:srgbClr val="7030A0"/>
-                </a:solidFill>
-              </a:rPr>
-              <a:t>+ </a:t>
-            </a:r>
-            <a:r>
-              <a:rPr lang="de-CH" dirty="0" err="1">
-                <a:solidFill>
-                  <a:srgbClr val="7030A0"/>
-                </a:solidFill>
-              </a:rPr>
-              <a:t>updateTrafficLights</a:t>
-            </a:r>
-            <a:r>
-              <a:rPr lang="de-CH" dirty="0">
-                <a:solidFill>
-                  <a:srgbClr val="7030A0"/>
-                </a:solidFill>
-              </a:rPr>
-              <a:t>(</a:t>
-            </a:r>
-            <a:r>
-              <a:rPr lang="de-CH" dirty="0" err="1">
-                <a:solidFill>
-                  <a:srgbClr val="7030A0"/>
-                </a:solidFill>
-              </a:rPr>
-              <a:t>actLightId</a:t>
-            </a:r>
-            <a:r>
-              <a:rPr lang="de-CH" dirty="0">
-                <a:solidFill>
-                  <a:srgbClr val="7030A0"/>
-                </a:solidFill>
-              </a:rPr>
-              <a:t> : </a:t>
-            </a:r>
-            <a:r>
-              <a:rPr lang="de-CH" dirty="0" err="1">
-                <a:solidFill>
-                  <a:srgbClr val="7030A0"/>
-                </a:solidFill>
-              </a:rPr>
-              <a:t>int</a:t>
-            </a:r>
-            <a:r>
-              <a:rPr lang="de-CH" dirty="0">
-                <a:solidFill>
-                  <a:srgbClr val="7030A0"/>
-                </a:solidFill>
-              </a:rPr>
-              <a:t>, </a:t>
-            </a:r>
-            <a:r>
-              <a:rPr lang="de-CH" dirty="0" err="1">
-                <a:solidFill>
-                  <a:srgbClr val="7030A0"/>
-                </a:solidFill>
-              </a:rPr>
-              <a:t>allowedLightTable</a:t>
-            </a:r>
-            <a:r>
-              <a:rPr lang="de-CH" dirty="0">
-                <a:solidFill>
-                  <a:srgbClr val="7030A0"/>
-                </a:solidFill>
-              </a:rPr>
-              <a:t> : </a:t>
-            </a:r>
-            <a:r>
-              <a:rPr lang="de-CH" dirty="0" err="1">
-                <a:solidFill>
-                  <a:srgbClr val="7030A0"/>
-                </a:solidFill>
-              </a:rPr>
-              <a:t>int</a:t>
-            </a:r>
-            <a:r>
-              <a:rPr lang="de-CH" dirty="0">
-                <a:solidFill>
-                  <a:srgbClr val="7030A0"/>
-                </a:solidFill>
-              </a:rPr>
-              <a:t>[][]) : </a:t>
-            </a:r>
-            <a:r>
-              <a:rPr lang="de-CH" dirty="0" err="1">
-                <a:solidFill>
-                  <a:srgbClr val="7030A0"/>
-                </a:solidFill>
-              </a:rPr>
-              <a:t>int</a:t>
-            </a:r>
-            <a:endParaRPr lang="de-CH" dirty="0">
-              <a:solidFill>
-                <a:srgbClr val="7030A0"/>
-              </a:solidFill>
-            </a:endParaRPr>
-          </a:p>
-          <a:p>
-            <a:pPr marL="0" indent="0">
-              <a:buNone/>
-            </a:pPr>
-            <a:r>
-              <a:rPr lang="de-CH" dirty="0">
-                <a:solidFill>
-                  <a:srgbClr val="7030A0"/>
-                </a:solidFill>
-              </a:rPr>
-              <a:t>+ </a:t>
-            </a:r>
-            <a:r>
-              <a:rPr lang="de-CH" dirty="0" err="1">
-                <a:solidFill>
-                  <a:srgbClr val="7030A0"/>
-                </a:solidFill>
-              </a:rPr>
-              <a:t>updateCrossroad</a:t>
-            </a:r>
-            <a:r>
-              <a:rPr lang="de-CH" dirty="0">
-                <a:solidFill>
-                  <a:srgbClr val="7030A0"/>
-                </a:solidFill>
-              </a:rPr>
-              <a:t>(</a:t>
-            </a:r>
-            <a:r>
-              <a:rPr lang="de-CH" dirty="0" err="1">
-                <a:solidFill>
-                  <a:srgbClr val="7030A0"/>
-                </a:solidFill>
-              </a:rPr>
-              <a:t>carsAndRoute</a:t>
-            </a:r>
-            <a:r>
-              <a:rPr lang="de-CH" dirty="0">
-                <a:solidFill>
-                  <a:srgbClr val="7030A0"/>
-                </a:solidFill>
-              </a:rPr>
-              <a:t> : </a:t>
-            </a:r>
-            <a:r>
-              <a:rPr lang="de-CH" dirty="0" err="1">
-                <a:solidFill>
-                  <a:srgbClr val="7030A0"/>
-                </a:solidFill>
-              </a:rPr>
-              <a:t>HashMap</a:t>
-            </a:r>
-            <a:r>
-              <a:rPr lang="de-CH" dirty="0">
-                <a:solidFill>
-                  <a:srgbClr val="7030A0"/>
-                </a:solidFill>
-              </a:rPr>
-              <a:t>, </a:t>
-            </a:r>
-            <a:r>
-              <a:rPr lang="de-CH" dirty="0" err="1">
-                <a:solidFill>
-                  <a:srgbClr val="7030A0"/>
-                </a:solidFill>
-              </a:rPr>
-              <a:t>pedstrainAndRoute</a:t>
-            </a:r>
-            <a:r>
-              <a:rPr lang="de-CH" dirty="0">
-                <a:solidFill>
-                  <a:srgbClr val="7030A0"/>
-                </a:solidFill>
-              </a:rPr>
-              <a:t> : </a:t>
-            </a:r>
-            <a:r>
-              <a:rPr lang="de-CH" dirty="0" err="1">
-                <a:solidFill>
-                  <a:srgbClr val="7030A0"/>
-                </a:solidFill>
-              </a:rPr>
-              <a:t>HashMap</a:t>
-            </a:r>
-            <a:r>
-              <a:rPr lang="de-CH" dirty="0">
-                <a:solidFill>
-                  <a:srgbClr val="7030A0"/>
-                </a:solidFill>
-              </a:rPr>
-              <a:t>)</a:t>
-            </a:r>
-            <a:endParaRPr lang="de-CH" dirty="0"/>
-          </a:p>
-          <a:p>
-            <a:pPr marL="0" indent="0">
-              <a:buNone/>
-            </a:pPr>
-            <a:r>
-              <a:rPr lang="de-CH" dirty="0">
-                <a:solidFill>
-                  <a:srgbClr val="FF0000"/>
-                </a:solidFill>
-              </a:rPr>
-              <a:t>+ </a:t>
-            </a:r>
-            <a:r>
-              <a:rPr lang="de-CH" dirty="0" err="1">
-                <a:solidFill>
-                  <a:srgbClr val="FF0000"/>
-                </a:solidFill>
-              </a:rPr>
-              <a:t>accident</a:t>
-            </a:r>
-            <a:r>
-              <a:rPr lang="de-CH" dirty="0">
-                <a:solidFill>
-                  <a:srgbClr val="FF0000"/>
-                </a:solidFill>
-              </a:rPr>
-              <a:t>()</a:t>
-            </a:r>
-          </a:p>
-          <a:p>
-            <a:pPr marL="0" indent="0">
-              <a:buNone/>
-            </a:pPr>
-            <a:r>
-              <a:rPr lang="de-CH" dirty="0">
-                <a:solidFill>
-                  <a:srgbClr val="FF0000"/>
-                </a:solidFill>
-              </a:rPr>
-              <a:t>+ </a:t>
-            </a:r>
-            <a:r>
-              <a:rPr lang="de-CH" dirty="0" err="1">
-                <a:solidFill>
-                  <a:srgbClr val="FF0000"/>
-                </a:solidFill>
-              </a:rPr>
-              <a:t>clearCrossroad</a:t>
-            </a:r>
-            <a:r>
-              <a:rPr lang="de-CH" dirty="0">
-                <a:solidFill>
-                  <a:srgbClr val="FF0000"/>
-                </a:solidFill>
-              </a:rPr>
-              <a:t>()</a:t>
-            </a:r>
-            <a:endParaRPr lang="de-CH" dirty="0"/>
-          </a:p>
-          <a:p>
-            <a:pPr marL="0" indent="0">
-              <a:buNone/>
-            </a:pPr>
-            <a:r>
-              <a:rPr lang="de-CH" dirty="0">
-                <a:solidFill>
-                  <a:srgbClr val="FF0000"/>
-                </a:solidFill>
-              </a:rPr>
-              <a:t>+ </a:t>
-            </a:r>
-            <a:r>
-              <a:rPr lang="de-CH" dirty="0" err="1">
-                <a:solidFill>
-                  <a:srgbClr val="FF0000"/>
-                </a:solidFill>
-              </a:rPr>
-              <a:t>stoppSimulate</a:t>
-            </a:r>
-            <a:r>
-              <a:rPr lang="de-CH" dirty="0">
-                <a:solidFill>
-                  <a:srgbClr val="FF0000"/>
-                </a:solidFill>
-              </a:rPr>
-              <a:t>()</a:t>
-            </a:r>
-            <a:endParaRPr lang="de-CH" dirty="0"/>
-          </a:p>
-        </p:txBody>
-      </p:sp>
-    </p:spTree>
-    <p:extLst>
-      <p:ext uri="{BB962C8B-B14F-4D97-AF65-F5344CB8AC3E}">
-        <p14:creationId xmlns:p14="http://schemas.microsoft.com/office/powerpoint/2010/main" val="2531455901"/>
-      </p:ext>
-    </p:extLst>
-  </p:cSld>
-  <p:clrMapOvr>
-    <a:masterClrMapping/>
-  </p:clrMapOvr>
-</p:sld>
-</file>
-
-<file path=ppt/slides/slide8.xml><?xml version="1.0" encoding="utf-8"?>
 <p:sld xmlns:a="http://schemas.openxmlformats.org/drawingml/2006/main" xmlns:r="http://schemas.openxmlformats.org/officeDocument/2006/relationships" xmlns:p="http://schemas.openxmlformats.org/presentationml/2006/main">
   <p:cSld>
     <p:spTree>
@@ -10467,7 +9665,7 @@
                     <a:lstStyle/>
                     <a:p>
                       <a:r>
-                        <a:rPr lang="de-CH" dirty="0"/>
+                        <a:rPr lang="de-CH"/>
                         <a:t>Klasse</a:t>
                       </a:r>
                     </a:p>
@@ -10480,7 +9678,7 @@
                     <a:lstStyle/>
                     <a:p>
                       <a:r>
-                        <a:rPr lang="de-CH" dirty="0"/>
+                        <a:rPr lang="de-CH"/>
                         <a:t>Priorität</a:t>
                       </a:r>
                     </a:p>
@@ -10493,7 +9691,7 @@
                     <a:lstStyle/>
                     <a:p>
                       <a:r>
-                        <a:rPr lang="de-CH" dirty="0"/>
+                        <a:rPr lang="de-CH"/>
                         <a:t>Anforderung</a:t>
                       </a:r>
                     </a:p>
@@ -10506,7 +9704,7 @@
                     <a:lstStyle/>
                     <a:p>
                       <a:r>
-                        <a:rPr lang="de-CH" dirty="0"/>
+                        <a:rPr lang="de-CH"/>
                         <a:t>Bemerkung</a:t>
                       </a:r>
                     </a:p>
@@ -10526,7 +9724,7 @@
                     <a:lstStyle/>
                     <a:p>
                       <a:r>
-                        <a:rPr lang="de-CH" dirty="0"/>
+                        <a:rPr lang="de-CH"/>
                         <a:t>Algorithmus</a:t>
                       </a:r>
                     </a:p>
@@ -10539,7 +9737,7 @@
                     <a:lstStyle/>
                     <a:p>
                       <a:r>
-                        <a:rPr lang="de-CH" dirty="0"/>
+                        <a:rPr lang="de-CH"/>
                         <a:t>2</a:t>
                       </a:r>
                     </a:p>
@@ -10552,7 +9750,7 @@
                     <a:lstStyle/>
                     <a:p>
                       <a:r>
-                        <a:rPr lang="de-CH" dirty="0"/>
+                        <a:rPr lang="de-CH"/>
                         <a:t>Sehr hoch</a:t>
                       </a:r>
                     </a:p>
@@ -10565,18 +9763,18 @@
                     <a:lstStyle/>
                     <a:p>
                       <a:r>
-                        <a:rPr lang="de-CH" i="1" dirty="0"/>
+                        <a:rPr lang="de-CH" i="1"/>
                         <a:t>Klasse Algorithmus und </a:t>
                       </a:r>
                       <a:r>
-                        <a:rPr lang="de-CH" i="1" dirty="0" err="1"/>
+                        <a:rPr lang="de-CH" i="1" err="1"/>
                         <a:t>GuiCrossroad</a:t>
                       </a:r>
                       <a:r>
-                        <a:rPr lang="de-CH" i="1" dirty="0"/>
+                        <a:rPr lang="de-CH" i="1"/>
                         <a:t> müssen «zusammen» Wachsen</a:t>
                       </a:r>
-                      <a:endParaRPr lang="de-CH" dirty="0"/>
+                      <a:endParaRPr lang="de-CH"/>
                     </a:p>
                   </a:txBody>
                   <a:tcPr/>
@@ -10594,10 +9792,10 @@
                     <a:lstStyle/>
                     <a:p>
                       <a:r>
-                        <a:rPr lang="de-CH" dirty="0" err="1"/>
+                        <a:rPr lang="de-CH" err="1"/>
                         <a:t>GuiCrossroad</a:t>
                       </a:r>
-                      <a:endParaRPr lang="de-CH" dirty="0"/>
+                      <a:endParaRPr lang="de-CH"/>
                     </a:p>
                   </a:txBody>
                   <a:tcPr/>
@@ -10608,7 +9806,7 @@
                     <a:lstStyle/>
                     <a:p>
                       <a:r>
-                        <a:rPr lang="de-CH" dirty="0"/>
+                        <a:rPr lang="de-CH"/>
                         <a:t>1</a:t>
                       </a:r>
                     </a:p>
@@ -10621,7 +9819,7 @@
                     <a:lstStyle/>
                     <a:p>
                       <a:r>
-                        <a:rPr lang="de-CH" dirty="0"/>
+                        <a:rPr lang="de-CH"/>
                         <a:t>Hoch</a:t>
                       </a:r>
                     </a:p>
@@ -10634,7 +9832,7 @@
                     <a:lstStyle/>
                     <a:p>
                       <a:r>
-                        <a:rPr lang="de-CH" dirty="0"/>
+                        <a:rPr lang="de-CH"/>
                         <a:t>Darstellung der Kreuzung und sämtliche GUI Interaktionen</a:t>
                       </a:r>
                     </a:p>
@@ -10654,10 +9852,10 @@
                     <a:lstStyle/>
                     <a:p>
                       <a:r>
-                        <a:rPr lang="de-CH" dirty="0" err="1"/>
+                        <a:rPr lang="de-CH" err="1"/>
                         <a:t>TrafficLight</a:t>
                       </a:r>
-                      <a:endParaRPr lang="de-CH" dirty="0"/>
+                      <a:endParaRPr lang="de-CH"/>
                     </a:p>
                   </a:txBody>
                   <a:tcPr/>
@@ -10668,7 +9866,7 @@
                     <a:lstStyle/>
                     <a:p>
                       <a:r>
-                        <a:rPr lang="de-CH" dirty="0"/>
+                        <a:rPr lang="de-CH"/>
                         <a:t>3</a:t>
                       </a:r>
                     </a:p>
@@ -10681,7 +9879,7 @@
                     <a:lstStyle/>
                     <a:p>
                       <a:r>
-                        <a:rPr lang="de-CH" dirty="0"/>
+                        <a:rPr lang="de-CH"/>
                         <a:t>Medium</a:t>
                       </a:r>
                     </a:p>
@@ -10694,7 +9892,7 @@
                     <a:lstStyle/>
                     <a:p>
                       <a:r>
-                        <a:rPr lang="de-CH" dirty="0"/>
+                        <a:rPr lang="de-CH"/>
                         <a:t>In sich abgeschlossene Klasse</a:t>
                       </a:r>
                     </a:p>
@@ -10714,10 +9912,10 @@
                     <a:lstStyle/>
                     <a:p>
                       <a:r>
-                        <a:rPr lang="de-CH" dirty="0" err="1"/>
+                        <a:rPr lang="de-CH" err="1"/>
                         <a:t>Pedstrain</a:t>
                       </a:r>
-                      <a:endParaRPr lang="de-CH" dirty="0"/>
+                      <a:endParaRPr lang="de-CH"/>
                     </a:p>
                   </a:txBody>
                   <a:tcPr/>
@@ -10728,7 +9926,7 @@
                     <a:lstStyle/>
                     <a:p>
                       <a:r>
-                        <a:rPr lang="de-CH" dirty="0"/>
+                        <a:rPr lang="de-CH"/>
                         <a:t>4</a:t>
                       </a:r>
                     </a:p>
@@ -10741,7 +9939,7 @@
                     <a:lstStyle/>
                     <a:p>
                       <a:r>
-                        <a:rPr lang="de-CH" dirty="0"/>
+                        <a:rPr lang="de-CH"/>
                         <a:t>Medium / Hoch</a:t>
                       </a:r>
                     </a:p>
@@ -10771,7 +9969,7 @@
                         <a:defRPr/>
                       </a:pPr>
                       <a:r>
-                        <a:rPr lang="de-CH" dirty="0"/>
+                        <a:rPr lang="de-CH"/>
                         <a:t>In sich abgeschlossene Klasse</a:t>
                       </a:r>
                     </a:p>
@@ -10791,7 +9989,7 @@
                     <a:lstStyle/>
                     <a:p>
                       <a:r>
-                        <a:rPr lang="de-CH" dirty="0"/>
+                        <a:rPr lang="de-CH"/>
                         <a:t>Car</a:t>
                       </a:r>
                     </a:p>
@@ -10804,7 +10002,7 @@
                     <a:lstStyle/>
                     <a:p>
                       <a:r>
-                        <a:rPr lang="de-CH" dirty="0"/>
+                        <a:rPr lang="de-CH"/>
                         <a:t>5</a:t>
                       </a:r>
                     </a:p>
@@ -10817,7 +10015,7 @@
                     <a:lstStyle/>
                     <a:p>
                       <a:r>
-                        <a:rPr lang="de-CH" dirty="0"/>
+                        <a:rPr lang="de-CH"/>
                         <a:t>Light / Medium</a:t>
                       </a:r>
                     </a:p>
@@ -10830,14 +10028,14 @@
                     <a:lstStyle/>
                     <a:p>
                       <a:r>
-                        <a:rPr lang="de-CH" dirty="0"/>
+                        <a:rPr lang="de-CH"/>
                         <a:t>Erbt von </a:t>
                       </a:r>
                       <a:r>
-                        <a:rPr lang="de-CH" dirty="0" err="1"/>
+                        <a:rPr lang="de-CH" err="1"/>
                         <a:t>Pedstrain</a:t>
                       </a:r>
-                      <a:endParaRPr lang="de-CH" dirty="0"/>
+                      <a:endParaRPr lang="de-CH"/>
                     </a:p>
                   </a:txBody>
                   <a:tcPr/>
@@ -10855,10 +10053,10 @@
                     <a:lstStyle/>
                     <a:p>
                       <a:r>
-                        <a:rPr lang="de-CH" dirty="0" err="1"/>
+                        <a:rPr lang="de-CH" err="1"/>
                         <a:t>PublicTraffic</a:t>
                       </a:r>
-                      <a:endParaRPr lang="de-CH" dirty="0"/>
+                      <a:endParaRPr lang="de-CH"/>
                     </a:p>
                   </a:txBody>
                   <a:tcPr/>
@@ -10869,7 +10067,7 @@
                     <a:lstStyle/>
                     <a:p>
                       <a:r>
-                        <a:rPr lang="de-CH" dirty="0"/>
+                        <a:rPr lang="de-CH"/>
                         <a:t>6</a:t>
                       </a:r>
                     </a:p>
@@ -10882,7 +10080,7 @@
                     <a:lstStyle/>
                     <a:p>
                       <a:r>
-                        <a:rPr lang="de-CH" dirty="0"/>
+                        <a:rPr lang="de-CH"/>
                         <a:t>Light</a:t>
                       </a:r>
                     </a:p>
@@ -10895,14 +10093,14 @@
                     <a:lstStyle/>
                     <a:p>
                       <a:r>
-                        <a:rPr lang="de-CH" dirty="0"/>
+                        <a:rPr lang="de-CH"/>
                         <a:t>Erbt von Car und </a:t>
                       </a:r>
                       <a:r>
-                        <a:rPr lang="de-CH" dirty="0" err="1"/>
+                        <a:rPr lang="de-CH" err="1"/>
                         <a:t>Pedstrain</a:t>
                       </a:r>
-                      <a:endParaRPr lang="de-CH" dirty="0"/>
+                      <a:endParaRPr lang="de-CH"/>
                     </a:p>
                   </a:txBody>
                   <a:tcPr/>
@@ -10944,14 +10142,14 @@
           <a:lstStyle/>
           <a:p>
             <a:r>
-              <a:rPr lang="de-CH" dirty="0"/>
+              <a:rPr lang="de-CH"/>
               <a:t>Relevanz/ </a:t>
             </a:r>
             <a:r>
-              <a:rPr lang="de-CH" dirty="0" err="1"/>
+              <a:rPr lang="de-CH" err="1"/>
               <a:t>Prioritöt</a:t>
             </a:r>
-            <a:endParaRPr lang="de-CH" dirty="0"/>
+            <a:endParaRPr lang="de-CH"/>
           </a:p>
         </p:txBody>
       </p:sp>
@@ -11419,6 +10617,21 @@
 </file>
 
 <file path=customXml/item1.xml><?xml version="1.0" encoding="utf-8"?>
+<?mso-contentType ?>
+<FormTemplates xmlns="http://schemas.microsoft.com/sharepoint/v3/contenttype/forms">
+  <Display>DocumentLibraryForm</Display>
+  <Edit>DocumentLibraryForm</Edit>
+  <New>DocumentLibraryForm</New>
+</FormTemplates>
+</file>
+
+<file path=customXml/item2.xml><?xml version="1.0" encoding="utf-8"?>
+<p:properties xmlns:p="http://schemas.microsoft.com/office/2006/metadata/properties" xmlns:xsi="http://www.w3.org/2001/XMLSchema-instance" xmlns:pc="http://schemas.microsoft.com/office/infopath/2007/PartnerControls">
+  <documentManagement/>
+</p:properties>
+</file>
+
+<file path=customXml/item3.xml><?xml version="1.0" encoding="utf-8"?>
 <ct:contentTypeSchema xmlns:ct="http://schemas.microsoft.com/office/2006/metadata/contentType" xmlns:ma="http://schemas.microsoft.com/office/2006/metadata/properties/metaAttributes" ct:_="" ma:_="" ma:contentTypeName="Dokument" ma:contentTypeID="0x010100CACE995AA946A94B88ACDEFD5D4AA2FD" ma:contentTypeVersion="3" ma:contentTypeDescription="Ein neues Dokument erstellen." ma:contentTypeScope="" ma:versionID="4ceb2d819718ab1e314097f5c60286a6">
   <xsd:schema xmlns:xsd="http://www.w3.org/2001/XMLSchema" xmlns:xs="http://www.w3.org/2001/XMLSchema" xmlns:p="http://schemas.microsoft.com/office/2006/metadata/properties" xmlns:ns2="d507507a-b2e4-4a70-9f0d-ba3f89d8d529" targetNamespace="http://schemas.microsoft.com/office/2006/metadata/properties" ma:root="true" ma:fieldsID="647c9ac65c25d6d514c228cffc0766be" ns2:_="">
     <xsd:import namespace="d507507a-b2e4-4a70-9f0d-ba3f89d8d529"/>
@@ -11556,26 +10769,7 @@
 </ct:contentTypeSchema>
 </file>
 
-<file path=customXml/item2.xml><?xml version="1.0" encoding="utf-8"?>
-<?mso-contentType ?>
-<FormTemplates xmlns="http://schemas.microsoft.com/sharepoint/v3/contenttype/forms">
-  <Display>DocumentLibraryForm</Display>
-  <Edit>DocumentLibraryForm</Edit>
-  <New>DocumentLibraryForm</New>
-</FormTemplates>
-</file>
-
-<file path=customXml/item3.xml><?xml version="1.0" encoding="utf-8"?>
-<p:properties xmlns:p="http://schemas.microsoft.com/office/2006/metadata/properties" xmlns:xsi="http://www.w3.org/2001/XMLSchema-instance" xmlns:pc="http://schemas.microsoft.com/office/infopath/2007/PartnerControls">
-  <documentManagement/>
-</p:properties>
-</file>
-
 <file path=customXml/itemProps1.xml><?xml version="1.0" encoding="utf-8"?>
-<ds:datastoreItem xmlns:ds="http://schemas.openxmlformats.org/officeDocument/2006/customXml" ds:itemID="{B1A0085B-DCF8-4CFB-84D7-A952F5FDF4DB}"/>
-</file>
-
-<file path=customXml/itemProps2.xml><?xml version="1.0" encoding="utf-8"?>
 <ds:datastoreItem xmlns:ds="http://schemas.openxmlformats.org/officeDocument/2006/customXml" ds:itemID="{829FD80C-7106-4755-B6BA-E5A5D8483E8D}">
   <ds:schemaRefs>
     <ds:schemaRef ds:uri="http://schemas.microsoft.com/sharepoint/v3/contenttype/forms"/>
@@ -11583,18 +10777,36 @@
 </ds:datastoreItem>
 </file>
 
-<file path=customXml/itemProps3.xml><?xml version="1.0" encoding="utf-8"?>
+<file path=customXml/itemProps2.xml><?xml version="1.0" encoding="utf-8"?>
 <ds:datastoreItem xmlns:ds="http://schemas.openxmlformats.org/officeDocument/2006/customXml" ds:itemID="{493FB586-2ADA-4FB7-83E4-74989D2014AE}">
   <ds:schemaRefs>
-    <ds:schemaRef ds:uri="http://purl.org/dc/terms/"/>
-    <ds:schemaRef ds:uri="http://schemas.openxmlformats.org/package/2006/metadata/core-properties"/>
     <ds:schemaRef ds:uri="http://purl.org/dc/dcmitype/"/>
     <ds:schemaRef ds:uri="http://schemas.microsoft.com/office/infopath/2007/PartnerControls"/>
     <ds:schemaRef ds:uri="http://purl.org/dc/elements/1.1/"/>
+    <ds:schemaRef ds:uri="http://schemas.microsoft.com/office/2006/metadata/properties"/>
     <ds:schemaRef ds:uri="http://schemas.microsoft.com/office/2006/documentManagement/types"/>
+    <ds:schemaRef ds:uri="http://purl.org/dc/terms/"/>
+    <ds:schemaRef ds:uri="http://schemas.openxmlformats.org/package/2006/metadata/core-properties"/>
     <ds:schemaRef ds:uri="d507507a-b2e4-4a70-9f0d-ba3f89d8d529"/>
-    <ds:schemaRef ds:uri="http://schemas.microsoft.com/office/2006/metadata/properties"/>
     <ds:schemaRef ds:uri="http://www.w3.org/XML/1998/namespace"/>
   </ds:schemaRefs>
 </ds:datastoreItem>
+</file>
+
+<file path=customXml/itemProps3.xml><?xml version="1.0" encoding="utf-8"?>
+<ds:datastoreItem xmlns:ds="http://schemas.openxmlformats.org/officeDocument/2006/customXml" ds:itemID="{B1A0085B-DCF8-4CFB-84D7-A952F5FDF4DB}">
+  <ds:schemaRefs>
+    <ds:schemaRef ds:uri="http://schemas.microsoft.com/office/2006/metadata/contentType"/>
+    <ds:schemaRef ds:uri="http://schemas.microsoft.com/office/2006/metadata/properties/metaAttributes"/>
+    <ds:schemaRef ds:uri="http://www.w3.org/2001/XMLSchema"/>
+    <ds:schemaRef ds:uri="http://schemas.microsoft.com/office/2006/metadata/properties"/>
+    <ds:schemaRef ds:uri="d507507a-b2e4-4a70-9f0d-ba3f89d8d529"/>
+    <ds:schemaRef ds:uri="http://schemas.microsoft.com/office/2006/documentManagement/types"/>
+    <ds:schemaRef ds:uri="http://schemas.microsoft.com/office/infopath/2007/PartnerControls"/>
+    <ds:schemaRef ds:uri="http://schemas.openxmlformats.org/package/2006/metadata/core-properties"/>
+    <ds:schemaRef ds:uri="http://purl.org/dc/elements/1.1/"/>
+    <ds:schemaRef ds:uri="http://purl.org/dc/terms/"/>
+    <ds:schemaRef ds:uri="http://schemas.microsoft.com/internal/obd"/>
+  </ds:schemaRefs>
+</ds:datastoreItem>
 </file>
</xml_diff>